<commit_message>
updating code and docs accroding to the checklist
</commit_message>
<xml_diff>
--- a/EDU GRAPH-API Demo Script.pptx
+++ b/EDU GRAPH-API Demo Script.pptx
@@ -372,7 +372,7 @@
               <a:rPr lang="en-US" smtClean="0">
                 <a:latin typeface="Segoe UI" pitchFamily="34" charset="0"/>
               </a:rPr>
-              <a:t>12/12/2016 6:37 PM</a:t>
+              <a:t>2/7/2017 2:59 PM</a:t>
             </a:fld>
             <a:endParaRPr lang="en-US" dirty="0">
               <a:latin typeface="Segoe UI" pitchFamily="34" charset="0"/>
@@ -655,7 +655,7 @@
           <a:p>
             <a:fld id="{38EEC551-8CDA-4EB6-89BB-2A86C9F091C8}" type="datetime8">
               <a:rPr lang="en-US" smtClean="0"/>
-              <a:t>12/12/2016 6:37 PM</a:t>
+              <a:t>2/7/2017 2:59 PM</a:t>
             </a:fld>
             <a:endParaRPr lang="en-US" dirty="0"/>
           </a:p>
@@ -1019,7 +1019,7 @@
           <a:p>
             <a:fld id="{C6996B83-60CF-42A8-BA06-F99D0BEC30B3}" type="datetime1">
               <a:rPr lang="en-US" smtClean="0"/>
-              <a:t>12/12/2016</a:t>
+              <a:t>2/7/2017</a:t>
             </a:fld>
             <a:endParaRPr lang="en-US" dirty="0"/>
           </a:p>
@@ -1239,7 +1239,7 @@
                 </a:solidFill>
               </a:rPr>
               <a:pPr/>
-              <a:t>12/12/2016</a:t>
+              <a:t>2/7/2017</a:t>
             </a:fld>
             <a:endParaRPr lang="en-US" dirty="0">
               <a:solidFill>
@@ -1449,7 +1449,7 @@
                 </a:solidFill>
               </a:rPr>
               <a:pPr/>
-              <a:t>12/12/2016</a:t>
+              <a:t>2/7/2017</a:t>
             </a:fld>
             <a:endParaRPr lang="en-US" dirty="0">
               <a:solidFill>
@@ -1659,7 +1659,7 @@
                 </a:solidFill>
               </a:rPr>
               <a:pPr/>
-              <a:t>12/12/2016</a:t>
+              <a:t>2/7/2017</a:t>
             </a:fld>
             <a:endParaRPr lang="en-US" dirty="0">
               <a:solidFill>
@@ -1838,7 +1838,7 @@
                 </a:solidFill>
               </a:rPr>
               <a:pPr/>
-              <a:t>12/12/2016</a:t>
+              <a:t>2/7/2017</a:t>
             </a:fld>
             <a:endParaRPr lang="en-US" dirty="0">
               <a:solidFill>
@@ -2079,7 +2079,7 @@
                 </a:solidFill>
               </a:rPr>
               <a:pPr/>
-              <a:t>12/12/2016</a:t>
+              <a:t>2/7/2017</a:t>
             </a:fld>
             <a:endParaRPr lang="en-US" dirty="0">
               <a:solidFill>
@@ -2289,7 +2289,7 @@
                 </a:solidFill>
               </a:rPr>
               <a:pPr/>
-              <a:t>12/12/2016</a:t>
+              <a:t>2/7/2017</a:t>
             </a:fld>
             <a:endParaRPr lang="en-US" dirty="0">
               <a:solidFill>
@@ -2499,7 +2499,7 @@
                 </a:solidFill>
               </a:rPr>
               <a:pPr/>
-              <a:t>12/12/2016</a:t>
+              <a:t>2/7/2017</a:t>
             </a:fld>
             <a:endParaRPr lang="en-US" dirty="0">
               <a:solidFill>
@@ -2709,7 +2709,7 @@
                 </a:solidFill>
               </a:rPr>
               <a:pPr/>
-              <a:t>12/12/2016</a:t>
+              <a:t>2/7/2017</a:t>
             </a:fld>
             <a:endParaRPr lang="en-US" dirty="0">
               <a:solidFill>
@@ -2919,7 +2919,7 @@
                 </a:solidFill>
               </a:rPr>
               <a:pPr/>
-              <a:t>12/12/2016</a:t>
+              <a:t>2/7/2017</a:t>
             </a:fld>
             <a:endParaRPr lang="en-US" dirty="0">
               <a:solidFill>
@@ -3129,7 +3129,7 @@
                 </a:solidFill>
               </a:rPr>
               <a:pPr/>
-              <a:t>12/12/2016</a:t>
+              <a:t>2/7/2017</a:t>
             </a:fld>
             <a:endParaRPr lang="en-US" dirty="0">
               <a:solidFill>
@@ -3303,7 +3303,7 @@
           <a:p>
             <a:fld id="{B079C3B8-7366-4A44-A34B-3977080C19E7}" type="datetime1">
               <a:rPr lang="en-US" smtClean="0"/>
-              <a:t>12/12/2016</a:t>
+              <a:t>2/7/2017</a:t>
             </a:fld>
             <a:endParaRPr lang="en-US" dirty="0"/>
           </a:p>
@@ -3493,7 +3493,7 @@
                 </a:solidFill>
               </a:rPr>
               <a:pPr/>
-              <a:t>12/12/2016</a:t>
+              <a:t>2/7/2017</a:t>
             </a:fld>
             <a:endParaRPr lang="en-US" dirty="0">
               <a:solidFill>
@@ -3734,7 +3734,7 @@
                 </a:solidFill>
               </a:rPr>
               <a:pPr/>
-              <a:t>12/12/2016</a:t>
+              <a:t>2/7/2017</a:t>
             </a:fld>
             <a:endParaRPr lang="en-US" dirty="0">
               <a:solidFill>
@@ -3944,7 +3944,7 @@
                 </a:solidFill>
               </a:rPr>
               <a:pPr/>
-              <a:t>12/12/2016</a:t>
+              <a:t>2/7/2017</a:t>
             </a:fld>
             <a:endParaRPr lang="en-US" dirty="0">
               <a:solidFill>
@@ -4154,7 +4154,7 @@
                 </a:solidFill>
               </a:rPr>
               <a:pPr/>
-              <a:t>12/12/2016</a:t>
+              <a:t>2/7/2017</a:t>
             </a:fld>
             <a:endParaRPr lang="en-US" dirty="0">
               <a:solidFill>
@@ -4364,7 +4364,7 @@
                 </a:solidFill>
               </a:rPr>
               <a:pPr/>
-              <a:t>12/12/2016</a:t>
+              <a:t>2/7/2017</a:t>
             </a:fld>
             <a:endParaRPr lang="en-US" dirty="0">
               <a:solidFill>
@@ -4574,7 +4574,7 @@
                 </a:solidFill>
               </a:rPr>
               <a:pPr/>
-              <a:t>12/12/2016</a:t>
+              <a:t>2/7/2017</a:t>
             </a:fld>
             <a:endParaRPr lang="en-US" dirty="0">
               <a:solidFill>
@@ -4784,7 +4784,7 @@
                 </a:solidFill>
               </a:rPr>
               <a:pPr/>
-              <a:t>12/12/2016</a:t>
+              <a:t>2/7/2017</a:t>
             </a:fld>
             <a:endParaRPr lang="en-US" dirty="0">
               <a:solidFill>
@@ -4963,7 +4963,7 @@
                 </a:solidFill>
               </a:rPr>
               <a:pPr/>
-              <a:t>12/12/2016</a:t>
+              <a:t>2/7/2017</a:t>
             </a:fld>
             <a:endParaRPr lang="en-US" dirty="0">
               <a:solidFill>
@@ -5204,7 +5204,7 @@
                 </a:solidFill>
               </a:rPr>
               <a:pPr/>
-              <a:t>12/12/2016</a:t>
+              <a:t>2/7/2017</a:t>
             </a:fld>
             <a:endParaRPr lang="en-US" dirty="0">
               <a:solidFill>
@@ -5383,7 +5383,7 @@
                 </a:solidFill>
               </a:rPr>
               <a:pPr/>
-              <a:t>12/12/2016</a:t>
+              <a:t>2/7/2017</a:t>
             </a:fld>
             <a:endParaRPr lang="en-US" dirty="0">
               <a:solidFill>
@@ -5593,7 +5593,7 @@
                 </a:solidFill>
               </a:rPr>
               <a:pPr/>
-              <a:t>12/12/2016</a:t>
+              <a:t>2/7/2017</a:t>
             </a:fld>
             <a:endParaRPr lang="en-US" dirty="0">
               <a:solidFill>
@@ -5834,7 +5834,7 @@
                 </a:solidFill>
               </a:rPr>
               <a:pPr/>
-              <a:t>12/12/2016</a:t>
+              <a:t>2/7/2017</a:t>
             </a:fld>
             <a:endParaRPr lang="en-US" dirty="0">
               <a:solidFill>
@@ -6044,7 +6044,7 @@
                 </a:solidFill>
               </a:rPr>
               <a:pPr/>
-              <a:t>12/12/2016</a:t>
+              <a:t>2/7/2017</a:t>
             </a:fld>
             <a:endParaRPr lang="en-US" dirty="0">
               <a:solidFill>
@@ -6223,7 +6223,7 @@
                 </a:solidFill>
               </a:rPr>
               <a:pPr/>
-              <a:t>12/12/2016</a:t>
+              <a:t>2/7/2017</a:t>
             </a:fld>
             <a:endParaRPr lang="en-US" dirty="0">
               <a:solidFill>
@@ -6464,7 +6464,7 @@
                 </a:solidFill>
               </a:rPr>
               <a:pPr/>
-              <a:t>12/12/2016</a:t>
+              <a:t>2/7/2017</a:t>
             </a:fld>
             <a:endParaRPr lang="en-US" dirty="0">
               <a:solidFill>
@@ -6674,7 +6674,7 @@
                 </a:solidFill>
               </a:rPr>
               <a:pPr/>
-              <a:t>12/12/2016</a:t>
+              <a:t>2/7/2017</a:t>
             </a:fld>
             <a:endParaRPr lang="en-US" dirty="0">
               <a:solidFill>
@@ -6884,7 +6884,7 @@
                 </a:solidFill>
               </a:rPr>
               <a:pPr/>
-              <a:t>12/12/2016</a:t>
+              <a:t>2/7/2017</a:t>
             </a:fld>
             <a:endParaRPr lang="en-US" dirty="0">
               <a:solidFill>
@@ -7063,7 +7063,7 @@
                 </a:solidFill>
               </a:rPr>
               <a:pPr/>
-              <a:t>12/12/2016</a:t>
+              <a:t>2/7/2017</a:t>
             </a:fld>
             <a:endParaRPr lang="en-US" dirty="0">
               <a:solidFill>
@@ -7304,7 +7304,7 @@
                 </a:solidFill>
               </a:rPr>
               <a:pPr/>
-              <a:t>12/12/2016</a:t>
+              <a:t>2/7/2017</a:t>
             </a:fld>
             <a:endParaRPr lang="en-US" dirty="0">
               <a:solidFill>
@@ -7483,7 +7483,7 @@
                 </a:solidFill>
               </a:rPr>
               <a:pPr/>
-              <a:t>12/12/2016</a:t>
+              <a:t>2/7/2017</a:t>
             </a:fld>
             <a:endParaRPr lang="en-US" dirty="0">
               <a:solidFill>
@@ -7724,7 +7724,7 @@
                 </a:solidFill>
               </a:rPr>
               <a:pPr/>
-              <a:t>12/12/2016</a:t>
+              <a:t>2/7/2017</a:t>
             </a:fld>
             <a:endParaRPr lang="en-US" dirty="0">
               <a:solidFill>
@@ -7934,7 +7934,7 @@
                 </a:solidFill>
               </a:rPr>
               <a:pPr/>
-              <a:t>12/12/2016</a:t>
+              <a:t>2/7/2017</a:t>
             </a:fld>
             <a:endParaRPr lang="en-US" dirty="0">
               <a:solidFill>
@@ -8113,7 +8113,7 @@
                 </a:solidFill>
               </a:rPr>
               <a:pPr/>
-              <a:t>12/12/2016</a:t>
+              <a:t>2/7/2017</a:t>
             </a:fld>
             <a:endParaRPr lang="en-US" dirty="0">
               <a:solidFill>
@@ -8354,7 +8354,7 @@
                 </a:solidFill>
               </a:rPr>
               <a:pPr/>
-              <a:t>12/12/2016</a:t>
+              <a:t>2/7/2017</a:t>
             </a:fld>
             <a:endParaRPr lang="en-US" dirty="0">
               <a:solidFill>
@@ -8564,7 +8564,7 @@
                 </a:solidFill>
               </a:rPr>
               <a:pPr/>
-              <a:t>12/12/2016</a:t>
+              <a:t>2/7/2017</a:t>
             </a:fld>
             <a:endParaRPr lang="en-US" dirty="0">
               <a:solidFill>
@@ -8774,7 +8774,7 @@
                 </a:solidFill>
               </a:rPr>
               <a:pPr/>
-              <a:t>12/12/2016</a:t>
+              <a:t>2/7/2017</a:t>
             </a:fld>
             <a:endParaRPr lang="en-US" dirty="0">
               <a:solidFill>
@@ -8984,7 +8984,7 @@
                 </a:solidFill>
               </a:rPr>
               <a:pPr/>
-              <a:t>12/12/2016</a:t>
+              <a:t>2/7/2017</a:t>
             </a:fld>
             <a:endParaRPr lang="en-US" dirty="0">
               <a:solidFill>
@@ -9194,7 +9194,7 @@
                 </a:solidFill>
               </a:rPr>
               <a:pPr/>
-              <a:t>12/12/2016</a:t>
+              <a:t>2/7/2017</a:t>
             </a:fld>
             <a:endParaRPr lang="en-US" dirty="0">
               <a:solidFill>
@@ -9404,7 +9404,7 @@
                 </a:solidFill>
               </a:rPr>
               <a:pPr/>
-              <a:t>12/12/2016</a:t>
+              <a:t>2/7/2017</a:t>
             </a:fld>
             <a:endParaRPr lang="en-US" dirty="0">
               <a:solidFill>
@@ -9614,7 +9614,7 @@
                 </a:solidFill>
               </a:rPr>
               <a:pPr/>
-              <a:t>12/12/2016</a:t>
+              <a:t>2/7/2017</a:t>
             </a:fld>
             <a:endParaRPr lang="en-US" dirty="0">
               <a:solidFill>
@@ -9824,7 +9824,7 @@
                 </a:solidFill>
               </a:rPr>
               <a:pPr/>
-              <a:t>12/12/2016</a:t>
+              <a:t>2/7/2017</a:t>
             </a:fld>
             <a:endParaRPr lang="en-US" dirty="0">
               <a:solidFill>
@@ -10034,7 +10034,7 @@
                 </a:solidFill>
               </a:rPr>
               <a:pPr/>
-              <a:t>12/12/2016</a:t>
+              <a:t>2/7/2017</a:t>
             </a:fld>
             <a:endParaRPr lang="en-US" dirty="0">
               <a:solidFill>
@@ -10244,7 +10244,7 @@
                 </a:solidFill>
               </a:rPr>
               <a:pPr/>
-              <a:t>12/12/2016</a:t>
+              <a:t>2/7/2017</a:t>
             </a:fld>
             <a:endParaRPr lang="en-US" dirty="0">
               <a:solidFill>
@@ -10454,7 +10454,7 @@
                 </a:solidFill>
               </a:rPr>
               <a:pPr/>
-              <a:t>12/12/2016</a:t>
+              <a:t>2/7/2017</a:t>
             </a:fld>
             <a:endParaRPr lang="en-US" dirty="0">
               <a:solidFill>
@@ -10664,7 +10664,7 @@
                 </a:solidFill>
               </a:rPr>
               <a:pPr/>
-              <a:t>12/12/2016</a:t>
+              <a:t>2/7/2017</a:t>
             </a:fld>
             <a:endParaRPr lang="en-US" dirty="0">
               <a:solidFill>
@@ -25283,7 +25283,7 @@
         </p:nvSpPr>
         <p:spPr>
           <a:xfrm>
-            <a:off x="5761037" y="1973262"/>
+            <a:off x="5753412" y="1668463"/>
             <a:ext cx="5865037" cy="3505200"/>
           </a:xfrm>
         </p:spPr>
@@ -26335,7 +26335,7 @@
         </p:nvSpPr>
         <p:spPr>
           <a:xfrm>
-            <a:off x="4849000" y="3040062"/>
+            <a:off x="5380037" y="2430462"/>
             <a:ext cx="7315203" cy="914400"/>
           </a:xfrm>
         </p:spPr>
@@ -26375,31 +26375,13 @@
             </a:pPr>
             <a:r>
               <a:rPr lang="en-US" dirty="0" smtClean="0"/>
-              <a:t>After link succeed it will go to all schools page.</a:t>
+              <a:t>After link succeed it will go to all schools page</a:t>
+            </a:r>
+            <a:r>
+              <a:rPr lang="en-US" dirty="0" smtClean="0"/>
+              <a:t>.</a:t>
             </a:r>
             <a:endParaRPr lang="en-US" dirty="0"/>
-          </a:p>
-          <a:p>
-            <a:pPr marL="571500" indent="-571500">
-              <a:buFont typeface="Arial" panose="020B0604020202020204" pitchFamily="34" charset="0"/>
-              <a:buChar char="•"/>
-            </a:pPr>
-            <a:r>
-              <a:rPr lang="en-US" dirty="0"/>
-              <a:t>Click the </a:t>
-            </a:r>
-            <a:r>
-              <a:rPr lang="en-US" b="1" dirty="0" smtClean="0"/>
-              <a:t>Cancel </a:t>
-            </a:r>
-            <a:r>
-              <a:rPr lang="en-US" dirty="0" smtClean="0"/>
-              <a:t>button </a:t>
-            </a:r>
-            <a:r>
-              <a:rPr lang="en-US" dirty="0"/>
-              <a:t>to show a basic page and stop.</a:t>
-            </a:r>
           </a:p>
         </p:txBody>
       </p:sp>
@@ -26427,7 +26409,7 @@
       </p:sp>
       <p:pic>
         <p:nvPicPr>
-          <p:cNvPr id="5" name="Picture 4"/>
+          <p:cNvPr id="6" name="Picture 5"/>
           <p:cNvPicPr>
             <a:picLocks noChangeAspect="1"/>
           </p:cNvPicPr>
@@ -26441,8 +26423,8 @@
         </p:blipFill>
         <p:spPr>
           <a:xfrm>
-            <a:off x="274639" y="1943291"/>
-            <a:ext cx="4532351" cy="1020571"/>
+            <a:off x="503237" y="1840119"/>
+            <a:ext cx="4695238" cy="1657143"/>
           </a:xfrm>
           <a:prstGeom prst="rect">
             <a:avLst/>
@@ -26880,7 +26862,7 @@
       </p:sp>
       <p:pic>
         <p:nvPicPr>
-          <p:cNvPr id="2" name="Picture 1"/>
+          <p:cNvPr id="6" name="Picture 5"/>
           <p:cNvPicPr>
             <a:picLocks noChangeAspect="1"/>
           </p:cNvPicPr>
@@ -26894,8 +26876,8 @@
         </p:blipFill>
         <p:spPr>
           <a:xfrm>
-            <a:off x="9205594" y="1363662"/>
-            <a:ext cx="2685714" cy="1866667"/>
+            <a:off x="8809037" y="1485036"/>
+            <a:ext cx="2114286" cy="1885714"/>
           </a:xfrm>
           <a:prstGeom prst="rect">
             <a:avLst/>
@@ -26904,7 +26886,7 @@
       </p:pic>
       <p:pic>
         <p:nvPicPr>
-          <p:cNvPr id="5" name="Picture 4"/>
+          <p:cNvPr id="7" name="Picture 6"/>
           <p:cNvPicPr>
             <a:picLocks noChangeAspect="1"/>
           </p:cNvPicPr>
@@ -26918,8 +26900,8 @@
         </p:blipFill>
         <p:spPr>
           <a:xfrm>
-            <a:off x="9190037" y="3667521"/>
-            <a:ext cx="2142857" cy="2285714"/>
+            <a:off x="8847133" y="3645885"/>
+            <a:ext cx="2076190" cy="2009524"/>
           </a:xfrm>
           <a:prstGeom prst="rect">
             <a:avLst/>
@@ -27025,7 +27007,15 @@
             </a:pPr>
             <a:r>
               <a:rPr lang="en-US" altLang="zh-CN" dirty="0" smtClean="0"/>
-              <a:t>If local account is not linked to O365 account it will show option “Login” and then link.</a:t>
+              <a:t>If local account is not linked to O365 account it will show option </a:t>
+            </a:r>
+            <a:r>
+              <a:rPr lang="en-US" altLang="zh-CN" dirty="0"/>
+              <a:t>“Link to existing O365 account” </a:t>
+            </a:r>
+            <a:r>
+              <a:rPr lang="en-US" altLang="zh-CN" dirty="0" smtClean="0"/>
+              <a:t>and then link.</a:t>
             </a:r>
             <a:endParaRPr lang="en-US" altLang="zh-CN" dirty="0"/>
           </a:p>
@@ -27056,7 +27046,7 @@
       </p:sp>
       <p:pic>
         <p:nvPicPr>
-          <p:cNvPr id="6" name="Picture 5"/>
+          <p:cNvPr id="4" name="Picture 3"/>
           <p:cNvPicPr>
             <a:picLocks noChangeAspect="1"/>
           </p:cNvPicPr>
@@ -27070,8 +27060,8 @@
         </p:blipFill>
         <p:spPr>
           <a:xfrm>
-            <a:off x="338409" y="1292325"/>
-            <a:ext cx="2514600" cy="1747737"/>
+            <a:off x="427037" y="3476977"/>
+            <a:ext cx="3461340" cy="1318969"/>
           </a:xfrm>
           <a:prstGeom prst="rect">
             <a:avLst/>
@@ -27080,7 +27070,7 @@
       </p:pic>
       <p:pic>
         <p:nvPicPr>
-          <p:cNvPr id="4" name="Picture 3"/>
+          <p:cNvPr id="8" name="Picture 7"/>
           <p:cNvPicPr>
             <a:picLocks noChangeAspect="1"/>
           </p:cNvPicPr>
@@ -27094,8 +27084,8 @@
         </p:blipFill>
         <p:spPr>
           <a:xfrm>
-            <a:off x="338409" y="3272313"/>
-            <a:ext cx="3461340" cy="1318969"/>
+            <a:off x="427037" y="1212849"/>
+            <a:ext cx="2114286" cy="1885714"/>
           </a:xfrm>
           <a:prstGeom prst="rect">
             <a:avLst/>
@@ -27104,7 +27094,7 @@
       </p:pic>
       <p:pic>
         <p:nvPicPr>
-          <p:cNvPr id="5" name="Picture 4"/>
+          <p:cNvPr id="9" name="Picture 8"/>
           <p:cNvPicPr>
             <a:picLocks noChangeAspect="1"/>
           </p:cNvPicPr>
@@ -27118,8 +27108,8 @@
         </p:blipFill>
         <p:spPr>
           <a:xfrm>
-            <a:off x="281487" y="4823533"/>
-            <a:ext cx="4196493" cy="1645529"/>
+            <a:off x="353966" y="5123621"/>
+            <a:ext cx="7314286" cy="1495238"/>
           </a:xfrm>
           <a:prstGeom prst="rect">
             <a:avLst/>
@@ -27476,7 +27466,7 @@
         </p:nvSpPr>
         <p:spPr>
           <a:xfrm>
-            <a:off x="4849000" y="3040062"/>
+            <a:off x="4849000" y="2735262"/>
             <a:ext cx="7315203" cy="914400"/>
           </a:xfrm>
         </p:spPr>
@@ -27493,8 +27483,8 @@
               <a:t>Click the </a:t>
             </a:r>
             <a:r>
-              <a:rPr lang="en-US" b="1" dirty="0" smtClean="0"/>
-              <a:t>Use Existing Local Account </a:t>
+              <a:rPr lang="en-US" b="1" dirty="0"/>
+              <a:t>Link with existing Local Account </a:t>
             </a:r>
             <a:r>
               <a:rPr lang="en-US" dirty="0" smtClean="0"/>
@@ -27519,39 +27509,24 @@
               <a:t>Click </a:t>
             </a:r>
             <a:r>
+              <a:rPr lang="en-US" b="1" dirty="0"/>
+              <a:t>Continue with new Local </a:t>
+            </a:r>
+            <a:r>
               <a:rPr lang="en-US" b="1" dirty="0" smtClean="0"/>
-              <a:t>Create Local account button </a:t>
+              <a:t>Account </a:t>
             </a:r>
             <a:r>
               <a:rPr lang="en-US" dirty="0" smtClean="0"/>
-              <a:t>to create a new local account and then link.</a:t>
-            </a:r>
-            <a:endParaRPr lang="en-US" dirty="0"/>
-          </a:p>
-          <a:p>
-            <a:pPr marL="571500" indent="-571500">
-              <a:buFont typeface="Arial" panose="020B0604020202020204" pitchFamily="34" charset="0"/>
-              <a:buChar char="•"/>
-            </a:pPr>
-            <a:r>
-              <a:rPr lang="en-US" dirty="0"/>
-              <a:t>Click the </a:t>
-            </a:r>
-            <a:r>
-              <a:rPr lang="en-US" b="1" dirty="0" smtClean="0"/>
-              <a:t>Cancel </a:t>
+              <a:t>to </a:t>
             </a:r>
             <a:r>
               <a:rPr lang="en-US" dirty="0" smtClean="0"/>
-              <a:t>button </a:t>
-            </a:r>
-            <a:r>
-              <a:rPr lang="en-US" dirty="0"/>
-              <a:t>to </a:t>
+              <a:t>create a new local account and then link</a:t>
             </a:r>
             <a:r>
               <a:rPr lang="en-US" dirty="0" smtClean="0"/>
-              <a:t>show a message and then stop.</a:t>
+              <a:t>.</a:t>
             </a:r>
             <a:endParaRPr lang="en-US" dirty="0"/>
           </a:p>
@@ -27581,7 +27556,7 @@
       </p:sp>
       <p:pic>
         <p:nvPicPr>
-          <p:cNvPr id="4" name="Picture 3"/>
+          <p:cNvPr id="6" name="Picture 5"/>
           <p:cNvPicPr>
             <a:picLocks noChangeAspect="1"/>
           </p:cNvPicPr>
@@ -27595,8 +27570,8 @@
         </p:blipFill>
         <p:spPr>
           <a:xfrm>
-            <a:off x="274639" y="1925833"/>
-            <a:ext cx="4535493" cy="885629"/>
+            <a:off x="274640" y="1744662"/>
+            <a:ext cx="4724398" cy="1590476"/>
           </a:xfrm>
           <a:prstGeom prst="rect">
             <a:avLst/>
@@ -27680,7 +27655,7 @@
         <p:spPr>
           <a:xfrm>
             <a:off x="274640" y="1820862"/>
-            <a:ext cx="6248398" cy="2400657"/>
+            <a:ext cx="6248398" cy="5293757"/>
           </a:xfrm>
           <a:prstGeom prst="rect">
             <a:avLst/>
@@ -27700,7 +27675,17 @@
             </a:r>
             <a:r>
               <a:rPr lang="en-US" dirty="0" smtClean="0"/>
-              <a:t>button to link.</a:t>
+              <a:t>button to link</a:t>
+            </a:r>
+            <a:r>
+              <a:rPr lang="en-US" dirty="0" smtClean="0"/>
+              <a:t>.</a:t>
+            </a:r>
+          </a:p>
+          <a:p>
+            <a:r>
+              <a:rPr lang="en-US" dirty="0" smtClean="0"/>
+              <a:t>If there’s a local account with the same email as O365 email, these input fields will no show and link directly.</a:t>
             </a:r>
             <a:endParaRPr lang="en-US" dirty="0"/>
           </a:p>
@@ -27797,28 +27782,12 @@
               <a:buChar char="•"/>
             </a:pPr>
             <a:r>
-              <a:rPr lang="en-US" dirty="0"/>
-              <a:t>Input the fields </a:t>
+              <a:rPr lang="en-US" dirty="0" smtClean="0"/>
+              <a:t>Select </a:t>
             </a:r>
             <a:r>
               <a:rPr lang="en-US" b="1" dirty="0"/>
               <a:t>Favorite color</a:t>
-            </a:r>
-            <a:r>
-              <a:rPr lang="en-US" dirty="0"/>
-              <a:t>, </a:t>
-            </a:r>
-            <a:r>
-              <a:rPr lang="en-US" b="1" dirty="0"/>
-              <a:t>Password</a:t>
-            </a:r>
-            <a:r>
-              <a:rPr lang="en-US" dirty="0"/>
-              <a:t> and </a:t>
-            </a:r>
-            <a:r>
-              <a:rPr lang="en-US" b="1" dirty="0"/>
-              <a:t>Confirm Password</a:t>
             </a:r>
             <a:r>
               <a:rPr lang="en-US" dirty="0"/>
@@ -27832,24 +27801,6 @@
             </a:pPr>
             <a:r>
               <a:rPr lang="en-US" dirty="0"/>
-              <a:t>Select </a:t>
-            </a:r>
-            <a:r>
-              <a:rPr lang="en-US" b="1" dirty="0"/>
-              <a:t>Favorite color</a:t>
-            </a:r>
-            <a:r>
-              <a:rPr lang="en-US" dirty="0"/>
-              <a:t>.</a:t>
-            </a:r>
-          </a:p>
-          <a:p>
-            <a:pPr marL="571500" indent="-571500">
-              <a:buFont typeface="Arial" panose="020B0604020202020204" pitchFamily="34" charset="0"/>
-              <a:buChar char="•"/>
-            </a:pPr>
-            <a:r>
-              <a:rPr lang="en-US" dirty="0"/>
               <a:t>Click the </a:t>
             </a:r>
             <a:r>
@@ -27887,7 +27838,7 @@
       </p:sp>
       <p:pic>
         <p:nvPicPr>
-          <p:cNvPr id="5" name="Picture 4"/>
+          <p:cNvPr id="4" name="Picture 3"/>
           <p:cNvPicPr>
             <a:picLocks noChangeAspect="1"/>
           </p:cNvPicPr>
@@ -27901,8 +27852,8 @@
         </p:blipFill>
         <p:spPr>
           <a:xfrm>
-            <a:off x="288019" y="1592262"/>
-            <a:ext cx="4600000" cy="3276190"/>
+            <a:off x="350837" y="1977215"/>
+            <a:ext cx="4498163" cy="1514286"/>
           </a:xfrm>
           <a:prstGeom prst="rect">
             <a:avLst/>
@@ -28025,7 +27976,7 @@
       </p:sp>
       <p:pic>
         <p:nvPicPr>
-          <p:cNvPr id="2" name="Picture 1"/>
+          <p:cNvPr id="4" name="Picture 3"/>
           <p:cNvPicPr>
             <a:picLocks noChangeAspect="1"/>
           </p:cNvPicPr>
@@ -28039,8 +27990,8 @@
         </p:blipFill>
         <p:spPr>
           <a:xfrm>
-            <a:off x="9205594" y="1363662"/>
-            <a:ext cx="2685714" cy="1866667"/>
+            <a:off x="8643890" y="1058862"/>
+            <a:ext cx="3047619" cy="1857143"/>
           </a:xfrm>
           <a:prstGeom prst="rect">
             <a:avLst/>
@@ -28049,7 +28000,7 @@
       </p:pic>
       <p:pic>
         <p:nvPicPr>
-          <p:cNvPr id="5" name="Picture 4"/>
+          <p:cNvPr id="6" name="Picture 5"/>
           <p:cNvPicPr>
             <a:picLocks noChangeAspect="1"/>
           </p:cNvPicPr>
@@ -28063,8 +28014,8 @@
         </p:blipFill>
         <p:spPr>
           <a:xfrm>
-            <a:off x="9190037" y="3667521"/>
-            <a:ext cx="2142857" cy="2285714"/>
+            <a:off x="8885237" y="3233797"/>
+            <a:ext cx="2266667" cy="3019048"/>
           </a:xfrm>
           <a:prstGeom prst="rect">
             <a:avLst/>
@@ -28170,7 +28121,19 @@
             </a:pPr>
             <a:r>
               <a:rPr lang="en-US" altLang="zh-CN" dirty="0" smtClean="0"/>
-              <a:t>If O365 account is not linked to local account it will show link options like “Login with local account” or “Create local account”.</a:t>
+              <a:t>If O365 account is not linked to local account it will show link options like </a:t>
+            </a:r>
+            <a:r>
+              <a:rPr lang="en-US" altLang="zh-CN" dirty="0"/>
+              <a:t>“Continue with new Local Account” </a:t>
+            </a:r>
+            <a:r>
+              <a:rPr lang="en-US" altLang="zh-CN" dirty="0" smtClean="0"/>
+              <a:t>or </a:t>
+            </a:r>
+            <a:r>
+              <a:rPr lang="en-US" altLang="zh-CN" dirty="0"/>
+              <a:t>“Link with existing Local Account”.</a:t>
             </a:r>
             <a:endParaRPr lang="en-US" altLang="zh-CN" dirty="0"/>
           </a:p>
@@ -28199,30 +28162,6 @@
           </a:p>
         </p:txBody>
       </p:sp>
-      <p:pic>
-        <p:nvPicPr>
-          <p:cNvPr id="6" name="Picture 5"/>
-          <p:cNvPicPr>
-            <a:picLocks noChangeAspect="1"/>
-          </p:cNvPicPr>
-          <p:nvPr/>
-        </p:nvPicPr>
-        <p:blipFill>
-          <a:blip r:embed="rId3"/>
-          <a:stretch>
-            <a:fillRect/>
-          </a:stretch>
-        </p:blipFill>
-        <p:spPr>
-          <a:xfrm>
-            <a:off x="338409" y="1292325"/>
-            <a:ext cx="2514600" cy="1747737"/>
-          </a:xfrm>
-          <a:prstGeom prst="rect">
-            <a:avLst/>
-          </a:prstGeom>
-        </p:spPr>
-      </p:pic>
       <p:pic>
         <p:nvPicPr>
           <p:cNvPr id="4" name="Picture 3"/>
@@ -28232,7 +28171,7 @@
           <p:nvPr/>
         </p:nvPicPr>
         <p:blipFill>
-          <a:blip r:embed="rId4"/>
+          <a:blip r:embed="rId3"/>
           <a:stretch>
             <a:fillRect/>
           </a:stretch>
@@ -28249,7 +28188,31 @@
       </p:pic>
       <p:pic>
         <p:nvPicPr>
-          <p:cNvPr id="7" name="Picture 6"/>
+          <p:cNvPr id="8" name="Picture 7"/>
+          <p:cNvPicPr>
+            <a:picLocks noChangeAspect="1"/>
+          </p:cNvPicPr>
+          <p:nvPr/>
+        </p:nvPicPr>
+        <p:blipFill>
+          <a:blip r:embed="rId4"/>
+          <a:stretch>
+            <a:fillRect/>
+          </a:stretch>
+        </p:blipFill>
+        <p:spPr>
+          <a:xfrm>
+            <a:off x="545269" y="1314009"/>
+            <a:ext cx="3047619" cy="1857143"/>
+          </a:xfrm>
+          <a:prstGeom prst="rect">
+            <a:avLst/>
+          </a:prstGeom>
+        </p:spPr>
+      </p:pic>
+      <p:pic>
+        <p:nvPicPr>
+          <p:cNvPr id="5" name="Picture 4"/>
           <p:cNvPicPr>
             <a:picLocks noChangeAspect="1"/>
           </p:cNvPicPr>
@@ -28263,8 +28226,8 @@
         </p:blipFill>
         <p:spPr>
           <a:xfrm>
-            <a:off x="338409" y="4823533"/>
-            <a:ext cx="2958288" cy="1887061"/>
+            <a:off x="347435" y="4945062"/>
+            <a:ext cx="5000000" cy="1428571"/>
           </a:xfrm>
           <a:prstGeom prst="rect">
             <a:avLst/>
@@ -29648,7 +29611,6 @@
               <a:rPr lang="en-US" dirty="0"/>
               <a:t>Teachers/Students</a:t>
             </a:r>
-            <a:endParaRPr lang="en-US" dirty="0"/>
           </a:p>
         </p:txBody>
       </p:sp>
@@ -30801,8 +30763,8 @@
         </p:nvSpPr>
         <p:spPr>
           <a:xfrm>
-            <a:off x="274640" y="1820862"/>
-            <a:ext cx="6248398" cy="5539978"/>
+            <a:off x="122236" y="1212849"/>
+            <a:ext cx="9212801" cy="4985980"/>
           </a:xfrm>
           <a:prstGeom prst="rect">
             <a:avLst/>
@@ -30812,15 +30774,16 @@
           <a:bodyPr/>
           <a:lstStyle/>
           <a:p>
+            <a:pPr marL="571500" indent="-571500"/>
             <a:r>
               <a:rPr lang="en-US" dirty="0"/>
-              <a:t>Go to </a:t>
+              <a:t>Got to </a:t>
             </a:r>
             <a:r>
               <a:rPr lang="en-US" dirty="0">
                 <a:hlinkClick r:id="rId3"/>
               </a:rPr>
-              <a:t>https://manage.windowsazure.com/</a:t>
+              <a:t>https://portal.azure.com</a:t>
             </a:r>
             <a:r>
               <a:rPr lang="en-US" dirty="0"/>
@@ -30828,23 +30791,25 @@
             </a:r>
           </a:p>
           <a:p>
+            <a:pPr marL="571500" indent="-571500"/>
+            <a:r>
+              <a:rPr lang="en-US" dirty="0" smtClean="0"/>
+              <a:t>Click </a:t>
+            </a:r>
+            <a:r>
+              <a:rPr lang="en-US" b="1" dirty="0" smtClean="0"/>
+              <a:t>Azure Active Directory </a:t>
+            </a:r>
+            <a:r>
+              <a:rPr lang="en-US" dirty="0" smtClean="0"/>
+              <a:t>icon on left navigation panel. </a:t>
+            </a:r>
+            <a:endParaRPr lang="en-US" dirty="0"/>
+          </a:p>
+          <a:p>
             <a:r>
               <a:rPr lang="en-US" dirty="0"/>
-              <a:t>Click </a:t>
-            </a:r>
-            <a:r>
-              <a:rPr lang="en-US" b="1" dirty="0"/>
-              <a:t>ACTIVE DIRECTORY</a:t>
-            </a:r>
-            <a:r>
-              <a:rPr lang="en-US" dirty="0"/>
-              <a:t> in the left menu.</a:t>
-            </a:r>
-          </a:p>
-          <a:p>
-            <a:r>
-              <a:rPr lang="en-US" dirty="0"/>
-              <a:t>Click the AD named </a:t>
+              <a:t>The AD named </a:t>
             </a:r>
             <a:r>
               <a:rPr lang="en-US" b="1" dirty="0"/>
@@ -30852,17 +30817,29 @@
             </a:r>
             <a:r>
               <a:rPr lang="en-US" dirty="0"/>
-              <a:t>. </a:t>
-            </a:r>
-          </a:p>
-          <a:p>
+              <a:t> will show. </a:t>
+            </a:r>
+          </a:p>
+          <a:p>
+            <a:r>
+              <a:rPr lang="en-US" dirty="0" smtClean="0"/>
+              <a:t>If the default AD opened is not </a:t>
+            </a:r>
+            <a:r>
+              <a:rPr lang="en-US" b="1" dirty="0" smtClean="0"/>
+              <a:t>Canviz EDU</a:t>
+            </a:r>
+            <a:r>
+              <a:rPr lang="en-US" dirty="0" smtClean="0"/>
+              <a:t>, switch AD by click user icon on top right corner of the page.</a:t>
+            </a:r>
             <a:endParaRPr lang="en-US" dirty="0"/>
           </a:p>
         </p:txBody>
       </p:sp>
       <p:pic>
         <p:nvPicPr>
-          <p:cNvPr id="2" name="Picture 1"/>
+          <p:cNvPr id="4" name="Picture 3"/>
           <p:cNvPicPr>
             <a:picLocks noChangeAspect="1"/>
           </p:cNvPicPr>
@@ -30876,8 +30853,8 @@
         </p:blipFill>
         <p:spPr>
           <a:xfrm>
-            <a:off x="6751637" y="1973262"/>
-            <a:ext cx="5319396" cy="2986711"/>
+            <a:off x="9571037" y="1212849"/>
+            <a:ext cx="2357167" cy="5564461"/>
           </a:xfrm>
           <a:prstGeom prst="rect">
             <a:avLst/>
@@ -30938,8 +30915,8 @@
         </p:nvSpPr>
         <p:spPr>
           <a:xfrm>
-            <a:off x="5700394" y="1897062"/>
-            <a:ext cx="6751638" cy="914400"/>
+            <a:off x="503237" y="1592262"/>
+            <a:ext cx="11506200" cy="914400"/>
           </a:xfrm>
         </p:spPr>
         <p:txBody>
@@ -30955,20 +30932,13 @@
               <a:t>Click the </a:t>
             </a:r>
             <a:r>
-              <a:rPr lang="en-US" b="1" dirty="0"/>
-              <a:t>Users</a:t>
-            </a:r>
-            <a:r>
-              <a:rPr lang="en-US" dirty="0"/>
-              <a:t> link to show all the users in the AD. </a:t>
-            </a:r>
-          </a:p>
-          <a:p>
-            <a:pPr marL="571500" indent="-571500">
-              <a:buFont typeface="Arial" panose="020B0604020202020204" pitchFamily="34" charset="0"/>
-              <a:buChar char="•"/>
-            </a:pPr>
-            <a:endParaRPr lang="en-US" dirty="0"/>
+              <a:rPr lang="en-US" b="1" dirty="0" smtClean="0"/>
+              <a:t>Users and groups</a:t>
+            </a:r>
+            <a:r>
+              <a:rPr lang="en-US" dirty="0" smtClean="0"/>
+              <a:t> and then click All users. All users will show. </a:t>
+            </a:r>
           </a:p>
         </p:txBody>
       </p:sp>
@@ -30996,7 +30966,7 @@
       </p:sp>
       <p:pic>
         <p:nvPicPr>
-          <p:cNvPr id="7" name="Picture 6"/>
+          <p:cNvPr id="5" name="Picture 4"/>
           <p:cNvPicPr>
             <a:picLocks noChangeAspect="1"/>
           </p:cNvPicPr>
@@ -31010,8 +30980,8 @@
         </p:blipFill>
         <p:spPr>
           <a:xfrm>
-            <a:off x="274639" y="1549624"/>
-            <a:ext cx="5892064" cy="2938238"/>
+            <a:off x="1112837" y="2735262"/>
+            <a:ext cx="10709185" cy="3593848"/>
           </a:xfrm>
           <a:prstGeom prst="rect">
             <a:avLst/>
@@ -31094,8 +31064,8 @@
         </p:nvSpPr>
         <p:spPr>
           <a:xfrm>
-            <a:off x="274640" y="1820863"/>
-            <a:ext cx="6248398" cy="3581399"/>
+            <a:off x="244475" y="1331437"/>
+            <a:ext cx="6583361" cy="4684359"/>
           </a:xfrm>
           <a:prstGeom prst="rect">
             <a:avLst/>
@@ -31106,48 +31076,67 @@
           <a:lstStyle/>
           <a:p>
             <a:r>
-              <a:rPr lang="en-US" dirty="0"/>
-              <a:t>Click a user and open the edit page</a:t>
-            </a:r>
-            <a:r>
-              <a:rPr lang="en-US" dirty="0" smtClean="0"/>
+              <a:rPr lang="en-US" sz="3600" dirty="0"/>
+              <a:t>Click a </a:t>
+            </a:r>
+            <a:r>
+              <a:rPr lang="en-US" sz="3600" dirty="0" smtClean="0"/>
+              <a:t>user’s name </a:t>
+            </a:r>
+            <a:r>
+              <a:rPr lang="en-US" sz="3600" dirty="0"/>
+              <a:t>and open the </a:t>
+            </a:r>
+            <a:r>
+              <a:rPr lang="en-US" sz="3600" dirty="0" smtClean="0"/>
+              <a:t>user detail </a:t>
+            </a:r>
+            <a:r>
+              <a:rPr lang="en-US" sz="3600" dirty="0"/>
+              <a:t>page</a:t>
+            </a:r>
+            <a:r>
+              <a:rPr lang="en-US" sz="3600" dirty="0" smtClean="0"/>
               <a:t>.</a:t>
             </a:r>
           </a:p>
           <a:p>
             <a:r>
-              <a:rPr lang="en-US" dirty="0" smtClean="0"/>
+              <a:rPr lang="en-US" sz="3600" dirty="0" smtClean="0"/>
+              <a:t>Click </a:t>
+            </a:r>
+            <a:r>
+              <a:rPr lang="en-US" sz="3600" b="1" dirty="0" smtClean="0"/>
+              <a:t>Profile</a:t>
+            </a:r>
+            <a:r>
+              <a:rPr lang="en-US" sz="3600" dirty="0" smtClean="0"/>
+              <a:t> will open edit profile page.</a:t>
+            </a:r>
+          </a:p>
+          <a:p>
+            <a:r>
+              <a:rPr lang="en-US" sz="3600" dirty="0" smtClean="0"/>
               <a:t>Update </a:t>
             </a:r>
             <a:r>
-              <a:rPr lang="en-US" dirty="0"/>
+              <a:rPr lang="en-US" sz="3600" dirty="0"/>
               <a:t>user information like </a:t>
             </a:r>
             <a:r>
-              <a:rPr lang="en-US" b="1" dirty="0"/>
-              <a:t>First name</a:t>
-            </a:r>
-            <a:r>
-              <a:rPr lang="en-US" dirty="0"/>
-              <a:t> or </a:t>
-            </a:r>
-            <a:r>
-              <a:rPr lang="en-US" b="1" dirty="0"/>
-              <a:t>Last name</a:t>
-            </a:r>
-            <a:r>
-              <a:rPr lang="en-US" dirty="0"/>
-              <a:t>.</a:t>
-            </a:r>
-          </a:p>
-          <a:p>
-            <a:r>
-              <a:rPr lang="en-US" dirty="0"/>
-              <a:t>Save the changes</a:t>
-            </a:r>
-            <a:r>
-              <a:rPr lang="en-US" dirty="0" smtClean="0"/>
-              <a:t>.</a:t>
+              <a:rPr lang="en-US" sz="3600" b="1" dirty="0" smtClean="0"/>
+              <a:t>Job title.</a:t>
+            </a:r>
+            <a:endParaRPr lang="en-US" sz="3600" dirty="0"/>
+          </a:p>
+          <a:p>
+            <a:r>
+              <a:rPr lang="en-US" sz="3600" dirty="0"/>
+              <a:t>Save </a:t>
+            </a:r>
+            <a:r>
+              <a:rPr lang="en-US" sz="3600" dirty="0" smtClean="0"/>
+              <a:t>changes.</a:t>
             </a:r>
           </a:p>
           <a:p>
@@ -31158,30 +31147,6 @@
           </a:p>
         </p:txBody>
       </p:sp>
-      <p:pic>
-        <p:nvPicPr>
-          <p:cNvPr id="4" name="Picture 3"/>
-          <p:cNvPicPr>
-            <a:picLocks noChangeAspect="1"/>
-          </p:cNvPicPr>
-          <p:nvPr/>
-        </p:nvPicPr>
-        <p:blipFill>
-          <a:blip r:embed="rId3"/>
-          <a:stretch>
-            <a:fillRect/>
-          </a:stretch>
-        </p:blipFill>
-        <p:spPr>
-          <a:xfrm>
-            <a:off x="6459251" y="1820862"/>
-            <a:ext cx="5704952" cy="3138373"/>
-          </a:xfrm>
-          <a:prstGeom prst="rect">
-            <a:avLst/>
-          </a:prstGeom>
-        </p:spPr>
-      </p:pic>
       <p:sp>
         <p:nvSpPr>
           <p:cNvPr id="2" name="TextBox 1"/>
@@ -31190,7 +31155,7 @@
         </p:nvSpPr>
         <p:spPr>
           <a:xfrm>
-            <a:off x="427037" y="5571896"/>
+            <a:off x="427037" y="5444651"/>
             <a:ext cx="11506200" cy="1855893"/>
           </a:xfrm>
           <a:prstGeom prst="rect">
@@ -31245,15 +31210,7 @@
             </a:pPr>
             <a:r>
               <a:rPr lang="en-US" sz="2400" b="1" dirty="0" smtClean="0"/>
-              <a:t>Only properties of Department, </a:t>
-            </a:r>
-            <a:r>
-              <a:rPr lang="en-US" sz="2400" b="1" dirty="0" err="1" smtClean="0"/>
-              <a:t>JobTitle</a:t>
-            </a:r>
-            <a:r>
-              <a:rPr lang="en-US" sz="2400" b="1" dirty="0" smtClean="0"/>
-              <a:t> and Mobile can be synced.</a:t>
+              <a:t>Only properties of Department, Job Title and Mobile can be synced.</a:t>
             </a:r>
           </a:p>
           <a:p>
@@ -31281,6 +31238,54 @@
           </a:p>
         </p:txBody>
       </p:sp>
+      <p:pic>
+        <p:nvPicPr>
+          <p:cNvPr id="5" name="Picture 4"/>
+          <p:cNvPicPr>
+            <a:picLocks noChangeAspect="1"/>
+          </p:cNvPicPr>
+          <p:nvPr/>
+        </p:nvPicPr>
+        <p:blipFill>
+          <a:blip r:embed="rId3"/>
+          <a:stretch>
+            <a:fillRect/>
+          </a:stretch>
+        </p:blipFill>
+        <p:spPr>
+          <a:xfrm>
+            <a:off x="6827837" y="1592262"/>
+            <a:ext cx="5247619" cy="1400000"/>
+          </a:xfrm>
+          <a:prstGeom prst="rect">
+            <a:avLst/>
+          </a:prstGeom>
+        </p:spPr>
+      </p:pic>
+      <p:pic>
+        <p:nvPicPr>
+          <p:cNvPr id="6" name="Picture 5"/>
+          <p:cNvPicPr>
+            <a:picLocks noChangeAspect="1"/>
+          </p:cNvPicPr>
+          <p:nvPr/>
+        </p:nvPicPr>
+        <p:blipFill>
+          <a:blip r:embed="rId4"/>
+          <a:stretch>
+            <a:fillRect/>
+          </a:stretch>
+        </p:blipFill>
+        <p:spPr>
+          <a:xfrm>
+            <a:off x="6942392" y="3268237"/>
+            <a:ext cx="5221811" cy="1781850"/>
+          </a:xfrm>
+          <a:prstGeom prst="rect">
+            <a:avLst/>
+          </a:prstGeom>
+        </p:spPr>
+      </p:pic>
     </p:spTree>
     <p:extLst>
       <p:ext uri="{BB962C8B-B14F-4D97-AF65-F5344CB8AC3E}">
@@ -31686,30 +31691,15 @@
               <a:rPr lang="en-US" sz="2800" dirty="0" smtClean="0">
                 <a:latin typeface="+mj-lt"/>
               </a:rPr>
-              <a:t>Admin can create a local account and then link.</a:t>
-            </a:r>
-          </a:p>
-          <a:p>
-            <a:pPr marL="527050" lvl="1" indent="-285750"/>
+              <a:t>Admin can create a local account and then link</a:t>
+            </a:r>
             <a:r>
               <a:rPr lang="en-US" sz="2800" dirty="0" smtClean="0">
                 <a:latin typeface="+mj-lt"/>
               </a:rPr>
-              <a:t>Click </a:t>
-            </a:r>
-            <a:r>
-              <a:rPr lang="en-US" sz="2800" b="1" dirty="0" smtClean="0">
-                <a:latin typeface="+mj-lt"/>
-              </a:rPr>
-              <a:t>Cancel</a:t>
-            </a:r>
-            <a:r>
-              <a:rPr lang="en-US" sz="2800" dirty="0" smtClean="0">
-                <a:latin typeface="+mj-lt"/>
-              </a:rPr>
-              <a:t> button will show a message to tell user that O365 account and local account must be linked..</a:t>
-            </a:r>
-            <a:endParaRPr lang="en-US" sz="2800" dirty="0">
+              <a:t>.</a:t>
+            </a:r>
+            <a:endParaRPr lang="en-US" sz="2800" dirty="0" smtClean="0">
               <a:latin typeface="+mj-lt"/>
             </a:endParaRPr>
           </a:p>
@@ -31739,7 +31729,7 @@
       </p:sp>
       <p:pic>
         <p:nvPicPr>
-          <p:cNvPr id="4" name="Picture 3"/>
+          <p:cNvPr id="5" name="Picture 4"/>
           <p:cNvPicPr>
             <a:picLocks noChangeAspect="1"/>
           </p:cNvPicPr>
@@ -31753,8 +31743,8 @@
         </p:blipFill>
         <p:spPr>
           <a:xfrm>
-            <a:off x="503237" y="4106862"/>
-            <a:ext cx="7866667" cy="1657143"/>
+            <a:off x="655637" y="3416889"/>
+            <a:ext cx="7285714" cy="1780952"/>
           </a:xfrm>
           <a:prstGeom prst="rect">
             <a:avLst/>
@@ -31863,7 +31853,7 @@
       </p:sp>
       <p:pic>
         <p:nvPicPr>
-          <p:cNvPr id="5" name="Picture 4"/>
+          <p:cNvPr id="4" name="Picture 3"/>
           <p:cNvPicPr>
             <a:picLocks noChangeAspect="1"/>
           </p:cNvPicPr>
@@ -31877,8 +31867,8 @@
         </p:blipFill>
         <p:spPr>
           <a:xfrm>
-            <a:off x="427037" y="2825553"/>
-            <a:ext cx="9219048" cy="1895238"/>
+            <a:off x="427037" y="3116262"/>
+            <a:ext cx="7342857" cy="1771429"/>
           </a:xfrm>
           <a:prstGeom prst="rect">
             <a:avLst/>
@@ -31939,8 +31929,8 @@
         </p:nvSpPr>
         <p:spPr>
           <a:xfrm>
-            <a:off x="5075237" y="2812823"/>
-            <a:ext cx="7088966" cy="914400"/>
+            <a:off x="157386" y="2125662"/>
+            <a:ext cx="11813366" cy="914400"/>
           </a:xfrm>
         </p:spPr>
         <p:txBody>
@@ -31961,12 +31951,25 @@
             </a:r>
             <a:r>
               <a:rPr lang="en-US" dirty="0"/>
-              <a:t>account, login and then link the </a:t>
+              <a:t>account, </a:t>
             </a:r>
             <a:r>
               <a:rPr lang="en-US" dirty="0" smtClean="0"/>
-              <a:t>local account with O365 account.</a:t>
-            </a:r>
+              <a:t>click </a:t>
+            </a:r>
+            <a:r>
+              <a:rPr lang="en-US" b="1" dirty="0" smtClean="0"/>
+              <a:t>Link with existing Local Account</a:t>
+            </a:r>
+            <a:r>
+              <a:rPr lang="en-US" dirty="0" smtClean="0"/>
+              <a:t> will link O365 account to local account</a:t>
+            </a:r>
+            <a:r>
+              <a:rPr lang="en-US" dirty="0" smtClean="0"/>
+              <a:t>.</a:t>
+            </a:r>
+            <a:endParaRPr lang="en-US" dirty="0" smtClean="0"/>
           </a:p>
           <a:p>
             <a:pPr marL="571500" indent="-571500">
@@ -32028,7 +32031,7 @@
       </p:sp>
       <p:pic>
         <p:nvPicPr>
-          <p:cNvPr id="4" name="Picture 3"/>
+          <p:cNvPr id="5" name="Picture 4"/>
           <p:cNvPicPr>
             <a:picLocks noChangeAspect="1"/>
           </p:cNvPicPr>
@@ -32042,8 +32045,8 @@
         </p:blipFill>
         <p:spPr>
           <a:xfrm>
-            <a:off x="274640" y="1668462"/>
-            <a:ext cx="4952998" cy="1600200"/>
+            <a:off x="350837" y="4183062"/>
+            <a:ext cx="7342857" cy="1771429"/>
           </a:xfrm>
           <a:prstGeom prst="rect">
             <a:avLst/>
@@ -32128,7 +32131,7 @@
         <p:spPr>
           <a:xfrm>
             <a:off x="274640" y="1820862"/>
-            <a:ext cx="6248398" cy="4739759"/>
+            <a:ext cx="6248398" cy="4185761"/>
           </a:xfrm>
           <a:prstGeom prst="rect">
             <a:avLst/>
@@ -32146,7 +32149,11 @@
           <a:p>
             <a:r>
               <a:rPr lang="en-US" dirty="0" smtClean="0"/>
-              <a:t>Input password and confirm password and then click </a:t>
+              <a:t>Select favorite color </a:t>
+            </a:r>
+            <a:r>
+              <a:rPr lang="en-US" dirty="0" smtClean="0"/>
+              <a:t>and then click </a:t>
             </a:r>
             <a:r>
               <a:rPr lang="en-US" b="1" dirty="0" smtClean="0"/>
@@ -32162,7 +32169,7 @@
       </p:sp>
       <p:pic>
         <p:nvPicPr>
-          <p:cNvPr id="2" name="Picture 1"/>
+          <p:cNvPr id="4" name="Picture 3"/>
           <p:cNvPicPr>
             <a:picLocks noChangeAspect="1"/>
           </p:cNvPicPr>
@@ -32176,8 +32183,8 @@
         </p:blipFill>
         <p:spPr>
           <a:xfrm>
-            <a:off x="6370637" y="1592262"/>
-            <a:ext cx="5580952" cy="3952381"/>
+            <a:off x="6549481" y="2125662"/>
+            <a:ext cx="4857143" cy="1542857"/>
           </a:xfrm>
           <a:prstGeom prst="rect">
             <a:avLst/>
@@ -33654,6 +33661,15 @@
 </file>
 
 <file path=customXml/item1.xml><?xml version="1.0" encoding="utf-8"?>
+<?mso-contentType ?>
+<FormTemplates xmlns="http://schemas.microsoft.com/sharepoint/v3/contenttype/forms">
+  <Display>DocumentLibraryForm</Display>
+  <Edit>DocumentLibraryForm</Edit>
+  <New>DocumentLibraryForm</New>
+</FormTemplates>
+</file>
+
+<file path=customXml/item2.xml><?xml version="1.0" encoding="utf-8"?>
 <ct:contentTypeSchema xmlns:ct="http://schemas.microsoft.com/office/2006/metadata/contentType" xmlns:ma="http://schemas.microsoft.com/office/2006/metadata/properties/metaAttributes" ct:_="" ma:_="" ma:contentTypeName="Document" ma:contentTypeID="0x01010053433B08FA9EE742BB667ECEF5AA0226" ma:contentTypeVersion="4" ma:contentTypeDescription="Create a new document." ma:contentTypeScope="" ma:versionID="898350153c3cb7409c9d00c11df4aa1a">
   <xsd:schema xmlns:xsd="http://www.w3.org/2001/XMLSchema" xmlns:xs="http://www.w3.org/2001/XMLSchema" xmlns:p="http://schemas.microsoft.com/office/2006/metadata/properties" xmlns:ns2="09eba053-c572-4474-974d-b0bef0e9174f" targetNamespace="http://schemas.microsoft.com/office/2006/metadata/properties" ma:root="true" ma:fieldsID="f69afda497831ad76ed280df00c0bf48" ns2:_="">
     <xsd:import namespace="09eba053-c572-4474-974d-b0bef0e9174f"/>
@@ -33815,22 +33831,21 @@
 </ct:contentTypeSchema>
 </file>
 
-<file path=customXml/item2.xml><?xml version="1.0" encoding="utf-8"?>
+<file path=customXml/item3.xml><?xml version="1.0" encoding="utf-8"?>
 <p:properties xmlns:p="http://schemas.microsoft.com/office/2006/metadata/properties" xmlns:xsi="http://www.w3.org/2001/XMLSchema-instance" xmlns:pc="http://schemas.microsoft.com/office/infopath/2007/PartnerControls">
   <documentManagement/>
 </p:properties>
 </file>
 
-<file path=customXml/item3.xml><?xml version="1.0" encoding="utf-8"?>
-<?mso-contentType ?>
-<FormTemplates xmlns="http://schemas.microsoft.com/sharepoint/v3/contenttype/forms">
-  <Display>DocumentLibraryForm</Display>
-  <Edit>DocumentLibraryForm</Edit>
-  <New>DocumentLibraryForm</New>
-</FormTemplates>
+<file path=customXml/itemProps1.xml><?xml version="1.0" encoding="utf-8"?>
+<ds:datastoreItem xmlns:ds="http://schemas.openxmlformats.org/officeDocument/2006/customXml" ds:itemID="{41543473-98BF-41A8-AEE8-AF1C274C4DD8}">
+  <ds:schemaRefs>
+    <ds:schemaRef ds:uri="http://schemas.microsoft.com/sharepoint/v3/contenttype/forms"/>
+  </ds:schemaRefs>
+</ds:datastoreItem>
 </file>
 
-<file path=customXml/itemProps1.xml><?xml version="1.0" encoding="utf-8"?>
+<file path=customXml/itemProps2.xml><?xml version="1.0" encoding="utf-8"?>
 <ds:datastoreItem xmlns:ds="http://schemas.openxmlformats.org/officeDocument/2006/customXml" ds:itemID="{55F7FE33-E5CA-47B4-B8F6-126891A96CF6}">
   <ds:schemaRefs>
     <ds:schemaRef ds:uri="http://schemas.microsoft.com/office/2006/metadata/contentType"/>
@@ -33848,7 +33863,7 @@
 </ds:datastoreItem>
 </file>
 
-<file path=customXml/itemProps2.xml><?xml version="1.0" encoding="utf-8"?>
+<file path=customXml/itemProps3.xml><?xml version="1.0" encoding="utf-8"?>
 <ds:datastoreItem xmlns:ds="http://schemas.openxmlformats.org/officeDocument/2006/customXml" ds:itemID="{479EF7F2-79F0-4950-9137-4016BE64CE46}">
   <ds:schemaRefs>
     <ds:schemaRef ds:uri="http://schemas.openxmlformats.org/package/2006/metadata/core-properties"/>
@@ -33862,12 +33877,4 @@
     <ds:schemaRef ds:uri="http://purl.org/dc/elements/1.1/"/>
   </ds:schemaRefs>
 </ds:datastoreItem>
-</file>
-
-<file path=customXml/itemProps3.xml><?xml version="1.0" encoding="utf-8"?>
-<ds:datastoreItem xmlns:ds="http://schemas.openxmlformats.org/officeDocument/2006/customXml" ds:itemID="{41543473-98BF-41A8-AEE8-AF1C274C4DD8}">
-  <ds:schemaRefs>
-    <ds:schemaRef ds:uri="http://schemas.microsoft.com/sharepoint/v3/contenttype/forms"/>
-  </ds:schemaRefs>
-</ds:datastoreItem>
 </file>
</xml_diff>

<commit_message>
checking in new changes - 02/10
</commit_message>
<xml_diff>
--- a/EDU GRAPH-API Demo Script.pptx
+++ b/EDU GRAPH-API Demo Script.pptx
@@ -285,7 +285,7 @@
 
 <file path=ppt/commentAuthors.xml><?xml version="1.0" encoding="utf-8"?>
 <p:cmAuthorLst xmlns:a="http://schemas.openxmlformats.org/drawingml/2006/main" xmlns:r="http://schemas.openxmlformats.org/officeDocument/2006/relationships" xmlns:p="http://schemas.openxmlformats.org/presentationml/2006/main">
-  <p:cmAuthor id="4" name="Author" initials="A" lastIdx="0" clrIdx="4"/>
+  <p:cmAuthor id="5" name="作者" initials="A" lastIdx="0" clrIdx="5"/>
 </p:cmAuthorLst>
 </file>
 
@@ -378,7 +378,7 @@
               <a:rPr lang="en-US" smtClean="0">
                 <a:latin typeface="Segoe UI" pitchFamily="34" charset="0"/>
               </a:rPr>
-              <a:t>2/9/2017 5:30 PM</a:t>
+              <a:t>2/10/2017 10:06 AM</a:t>
             </a:fld>
             <a:endParaRPr lang="en-US" dirty="0">
               <a:latin typeface="Segoe UI" pitchFamily="34" charset="0"/>
@@ -661,7 +661,7 @@
           <a:p>
             <a:fld id="{38EEC551-8CDA-4EB6-89BB-2A86C9F091C8}" type="datetime8">
               <a:rPr lang="en-US" smtClean="0"/>
-              <a:t>2/9/2017 5:30 PM</a:t>
+              <a:t>2/10/2017 10:06 AM</a:t>
             </a:fld>
             <a:endParaRPr lang="en-US" dirty="0"/>
           </a:p>
@@ -1025,7 +1025,7 @@
           <a:p>
             <a:fld id="{C6996B83-60CF-42A8-BA06-F99D0BEC30B3}" type="datetime1">
               <a:rPr lang="en-US" smtClean="0"/>
-              <a:t>2/9/2017</a:t>
+              <a:t>2/10/2017</a:t>
             </a:fld>
             <a:endParaRPr lang="en-US" dirty="0"/>
           </a:p>
@@ -1245,7 +1245,7 @@
                 </a:solidFill>
               </a:rPr>
               <a:pPr/>
-              <a:t>2/9/2017</a:t>
+              <a:t>2/10/2017</a:t>
             </a:fld>
             <a:endParaRPr lang="en-US" dirty="0">
               <a:solidFill>
@@ -1455,7 +1455,7 @@
                 </a:solidFill>
               </a:rPr>
               <a:pPr/>
-              <a:t>2/9/2017</a:t>
+              <a:t>2/10/2017</a:t>
             </a:fld>
             <a:endParaRPr lang="en-US" dirty="0">
               <a:solidFill>
@@ -1665,7 +1665,7 @@
                 </a:solidFill>
               </a:rPr>
               <a:pPr/>
-              <a:t>2/9/2017</a:t>
+              <a:t>2/10/2017</a:t>
             </a:fld>
             <a:endParaRPr lang="en-US" dirty="0">
               <a:solidFill>
@@ -1971,7 +1971,7 @@
                 <a:tabLst/>
                 <a:defRPr/>
               </a:pPr>
-              <a:t>2/9/2017</a:t>
+              <a:t>2/10/2017</a:t>
             </a:fld>
             <a:endParaRPr kumimoji="0" lang="en-US" sz="1800" b="0" i="0" u="none" strike="noStrike" kern="0" cap="none" spc="0" normalizeH="0" baseline="0" noProof="0" dirty="0">
               <a:ln>
@@ -2201,7 +2201,7 @@
                 </a:solidFill>
               </a:rPr>
               <a:pPr/>
-              <a:t>2/9/2017</a:t>
+              <a:t>2/10/2017</a:t>
             </a:fld>
             <a:endParaRPr lang="en-US" dirty="0">
               <a:solidFill>
@@ -2442,7 +2442,7 @@
                 </a:solidFill>
               </a:rPr>
               <a:pPr/>
-              <a:t>2/9/2017</a:t>
+              <a:t>2/10/2017</a:t>
             </a:fld>
             <a:endParaRPr lang="en-US" dirty="0">
               <a:solidFill>
@@ -2652,7 +2652,7 @@
                 </a:solidFill>
               </a:rPr>
               <a:pPr/>
-              <a:t>2/9/2017</a:t>
+              <a:t>2/10/2017</a:t>
             </a:fld>
             <a:endParaRPr lang="en-US" dirty="0">
               <a:solidFill>
@@ -2862,7 +2862,7 @@
                 </a:solidFill>
               </a:rPr>
               <a:pPr/>
-              <a:t>2/9/2017</a:t>
+              <a:t>2/10/2017</a:t>
             </a:fld>
             <a:endParaRPr lang="en-US" dirty="0">
               <a:solidFill>
@@ -3072,7 +3072,7 @@
                 </a:solidFill>
               </a:rPr>
               <a:pPr/>
-              <a:t>2/9/2017</a:t>
+              <a:t>2/10/2017</a:t>
             </a:fld>
             <a:endParaRPr lang="en-US" dirty="0">
               <a:solidFill>
@@ -3282,7 +3282,7 @@
                 </a:solidFill>
               </a:rPr>
               <a:pPr/>
-              <a:t>2/9/2017</a:t>
+              <a:t>2/10/2017</a:t>
             </a:fld>
             <a:endParaRPr lang="en-US" dirty="0">
               <a:solidFill>
@@ -3456,7 +3456,7 @@
           <a:p>
             <a:fld id="{B079C3B8-7366-4A44-A34B-3977080C19E7}" type="datetime1">
               <a:rPr lang="en-US" smtClean="0"/>
-              <a:t>2/9/2017</a:t>
+              <a:t>2/10/2017</a:t>
             </a:fld>
             <a:endParaRPr lang="en-US" dirty="0"/>
           </a:p>
@@ -3677,7 +3677,7 @@
                 </a:solidFill>
               </a:rPr>
               <a:pPr/>
-              <a:t>2/9/2017</a:t>
+              <a:t>2/10/2017</a:t>
             </a:fld>
             <a:endParaRPr lang="en-US" dirty="0">
               <a:solidFill>
@@ -3983,7 +3983,7 @@
                 <a:tabLst/>
                 <a:defRPr/>
               </a:pPr>
-              <a:t>2/9/2017</a:t>
+              <a:t>2/10/2017</a:t>
             </a:fld>
             <a:endParaRPr kumimoji="0" lang="en-US" sz="1800" b="0" i="0" u="none" strike="noStrike" kern="0" cap="none" spc="0" normalizeH="0" baseline="0" noProof="0" dirty="0">
               <a:ln>
@@ -4213,7 +4213,7 @@
                 </a:solidFill>
               </a:rPr>
               <a:pPr/>
-              <a:t>2/9/2017</a:t>
+              <a:t>2/10/2017</a:t>
             </a:fld>
             <a:endParaRPr lang="en-US" dirty="0">
               <a:solidFill>
@@ -4454,7 +4454,7 @@
                 </a:solidFill>
               </a:rPr>
               <a:pPr/>
-              <a:t>2/9/2017</a:t>
+              <a:t>2/10/2017</a:t>
             </a:fld>
             <a:endParaRPr lang="en-US" dirty="0">
               <a:solidFill>
@@ -4664,7 +4664,7 @@
                 </a:solidFill>
               </a:rPr>
               <a:pPr/>
-              <a:t>2/9/2017</a:t>
+              <a:t>2/10/2017</a:t>
             </a:fld>
             <a:endParaRPr lang="en-US" dirty="0">
               <a:solidFill>
@@ -4874,7 +4874,7 @@
                 </a:solidFill>
               </a:rPr>
               <a:pPr/>
-              <a:t>2/9/2017</a:t>
+              <a:t>2/10/2017</a:t>
             </a:fld>
             <a:endParaRPr lang="en-US" dirty="0">
               <a:solidFill>
@@ -5084,7 +5084,7 @@
                 </a:solidFill>
               </a:rPr>
               <a:pPr/>
-              <a:t>2/9/2017</a:t>
+              <a:t>2/10/2017</a:t>
             </a:fld>
             <a:endParaRPr lang="en-US" dirty="0">
               <a:solidFill>
@@ -5294,7 +5294,7 @@
                 </a:solidFill>
               </a:rPr>
               <a:pPr/>
-              <a:t>2/9/2017</a:t>
+              <a:t>2/10/2017</a:t>
             </a:fld>
             <a:endParaRPr lang="en-US" dirty="0">
               <a:solidFill>
@@ -5504,7 +5504,7 @@
                 </a:solidFill>
               </a:rPr>
               <a:pPr/>
-              <a:t>2/9/2017</a:t>
+              <a:t>2/10/2017</a:t>
             </a:fld>
             <a:endParaRPr lang="en-US" dirty="0">
               <a:solidFill>
@@ -5810,7 +5810,7 @@
                 <a:tabLst/>
                 <a:defRPr/>
               </a:pPr>
-              <a:t>2/9/2017</a:t>
+              <a:t>2/10/2017</a:t>
             </a:fld>
             <a:endParaRPr kumimoji="0" lang="en-US" sz="1800" b="0" i="0" u="none" strike="noStrike" kern="0" cap="none" spc="0" normalizeH="0" baseline="0" noProof="0" dirty="0">
               <a:ln>
@@ -6040,7 +6040,7 @@
                 </a:solidFill>
               </a:rPr>
               <a:pPr/>
-              <a:t>2/9/2017</a:t>
+              <a:t>2/10/2017</a:t>
             </a:fld>
             <a:endParaRPr lang="en-US" dirty="0">
               <a:solidFill>
@@ -6250,7 +6250,7 @@
                 </a:solidFill>
               </a:rPr>
               <a:pPr/>
-              <a:t>2/9/2017</a:t>
+              <a:t>2/10/2017</a:t>
             </a:fld>
             <a:endParaRPr lang="en-US" dirty="0">
               <a:solidFill>
@@ -6491,7 +6491,7 @@
                 </a:solidFill>
               </a:rPr>
               <a:pPr/>
-              <a:t>2/9/2017</a:t>
+              <a:t>2/10/2017</a:t>
             </a:fld>
             <a:endParaRPr lang="en-US" dirty="0">
               <a:solidFill>
@@ -6670,7 +6670,7 @@
                 </a:solidFill>
               </a:rPr>
               <a:pPr/>
-              <a:t>2/9/2017</a:t>
+              <a:t>2/10/2017</a:t>
             </a:fld>
             <a:endParaRPr lang="en-US" dirty="0">
               <a:solidFill>
@@ -6911,7 +6911,7 @@
                 </a:solidFill>
               </a:rPr>
               <a:pPr/>
-              <a:t>2/9/2017</a:t>
+              <a:t>2/10/2017</a:t>
             </a:fld>
             <a:endParaRPr lang="en-US" dirty="0">
               <a:solidFill>
@@ -7121,7 +7121,7 @@
                 </a:solidFill>
               </a:rPr>
               <a:pPr/>
-              <a:t>2/9/2017</a:t>
+              <a:t>2/10/2017</a:t>
             </a:fld>
             <a:endParaRPr lang="en-US" dirty="0">
               <a:solidFill>
@@ -7300,7 +7300,7 @@
                 </a:solidFill>
               </a:rPr>
               <a:pPr/>
-              <a:t>2/9/2017</a:t>
+              <a:t>2/10/2017</a:t>
             </a:fld>
             <a:endParaRPr lang="en-US" dirty="0">
               <a:solidFill>
@@ -7541,7 +7541,7 @@
                 </a:solidFill>
               </a:rPr>
               <a:pPr/>
-              <a:t>2/9/2017</a:t>
+              <a:t>2/10/2017</a:t>
             </a:fld>
             <a:endParaRPr lang="en-US" dirty="0">
               <a:solidFill>
@@ -7751,7 +7751,7 @@
                 </a:solidFill>
               </a:rPr>
               <a:pPr/>
-              <a:t>2/9/2017</a:t>
+              <a:t>2/10/2017</a:t>
             </a:fld>
             <a:endParaRPr lang="en-US" dirty="0">
               <a:solidFill>
@@ -7961,7 +7961,7 @@
                 </a:solidFill>
               </a:rPr>
               <a:pPr/>
-              <a:t>2/9/2017</a:t>
+              <a:t>2/10/2017</a:t>
             </a:fld>
             <a:endParaRPr lang="en-US" dirty="0">
               <a:solidFill>
@@ -8140,7 +8140,7 @@
                 </a:solidFill>
               </a:rPr>
               <a:pPr/>
-              <a:t>2/9/2017</a:t>
+              <a:t>2/10/2017</a:t>
             </a:fld>
             <a:endParaRPr lang="en-US" dirty="0">
               <a:solidFill>
@@ -8381,7 +8381,7 @@
                 </a:solidFill>
               </a:rPr>
               <a:pPr/>
-              <a:t>2/9/2017</a:t>
+              <a:t>2/10/2017</a:t>
             </a:fld>
             <a:endParaRPr lang="en-US" dirty="0">
               <a:solidFill>
@@ -8591,7 +8591,7 @@
                 </a:solidFill>
               </a:rPr>
               <a:pPr/>
-              <a:t>2/9/2017</a:t>
+              <a:t>2/10/2017</a:t>
             </a:fld>
             <a:endParaRPr lang="en-US" dirty="0">
               <a:solidFill>
@@ -8770,7 +8770,7 @@
                 </a:solidFill>
               </a:rPr>
               <a:pPr/>
-              <a:t>2/9/2017</a:t>
+              <a:t>2/10/2017</a:t>
             </a:fld>
             <a:endParaRPr lang="en-US" dirty="0">
               <a:solidFill>
@@ -9011,7 +9011,7 @@
                 </a:solidFill>
               </a:rPr>
               <a:pPr/>
-              <a:t>2/9/2017</a:t>
+              <a:t>2/10/2017</a:t>
             </a:fld>
             <a:endParaRPr lang="en-US" dirty="0">
               <a:solidFill>
@@ -9190,7 +9190,7 @@
                 </a:solidFill>
               </a:rPr>
               <a:pPr/>
-              <a:t>2/9/2017</a:t>
+              <a:t>2/10/2017</a:t>
             </a:fld>
             <a:endParaRPr lang="en-US" dirty="0">
               <a:solidFill>
@@ -9431,7 +9431,7 @@
                 </a:solidFill>
               </a:rPr>
               <a:pPr/>
-              <a:t>2/9/2017</a:t>
+              <a:t>2/10/2017</a:t>
             </a:fld>
             <a:endParaRPr lang="en-US" dirty="0">
               <a:solidFill>
@@ -9641,7 +9641,7 @@
                 </a:solidFill>
               </a:rPr>
               <a:pPr/>
-              <a:t>2/9/2017</a:t>
+              <a:t>2/10/2017</a:t>
             </a:fld>
             <a:endParaRPr lang="en-US" dirty="0">
               <a:solidFill>
@@ -9851,7 +9851,7 @@
                 </a:solidFill>
               </a:rPr>
               <a:pPr/>
-              <a:t>2/9/2017</a:t>
+              <a:t>2/10/2017</a:t>
             </a:fld>
             <a:endParaRPr lang="en-US" dirty="0">
               <a:solidFill>
@@ -10061,7 +10061,7 @@
                 </a:solidFill>
               </a:rPr>
               <a:pPr/>
-              <a:t>2/9/2017</a:t>
+              <a:t>2/10/2017</a:t>
             </a:fld>
             <a:endParaRPr lang="en-US" dirty="0">
               <a:solidFill>
@@ -10271,7 +10271,7 @@
                 </a:solidFill>
               </a:rPr>
               <a:pPr/>
-              <a:t>2/9/2017</a:t>
+              <a:t>2/10/2017</a:t>
             </a:fld>
             <a:endParaRPr lang="en-US" dirty="0">
               <a:solidFill>
@@ -10481,7 +10481,7 @@
                 </a:solidFill>
               </a:rPr>
               <a:pPr/>
-              <a:t>2/9/2017</a:t>
+              <a:t>2/10/2017</a:t>
             </a:fld>
             <a:endParaRPr lang="en-US" dirty="0">
               <a:solidFill>
@@ -10691,7 +10691,7 @@
                 </a:solidFill>
               </a:rPr>
               <a:pPr/>
-              <a:t>2/9/2017</a:t>
+              <a:t>2/10/2017</a:t>
             </a:fld>
             <a:endParaRPr lang="en-US" dirty="0">
               <a:solidFill>
@@ -10901,7 +10901,7 @@
                 </a:solidFill>
               </a:rPr>
               <a:pPr/>
-              <a:t>2/9/2017</a:t>
+              <a:t>2/10/2017</a:t>
             </a:fld>
             <a:endParaRPr lang="en-US" dirty="0">
               <a:solidFill>
@@ -11111,7 +11111,7 @@
                 </a:solidFill>
               </a:rPr>
               <a:pPr/>
-              <a:t>2/9/2017</a:t>
+              <a:t>2/10/2017</a:t>
             </a:fld>
             <a:endParaRPr lang="en-US" dirty="0">
               <a:solidFill>
@@ -11321,7 +11321,7 @@
                 </a:solidFill>
               </a:rPr>
               <a:pPr/>
-              <a:t>2/9/2017</a:t>
+              <a:t>2/10/2017</a:t>
             </a:fld>
             <a:endParaRPr lang="en-US" dirty="0">
               <a:solidFill>
@@ -11531,7 +11531,7 @@
                 </a:solidFill>
               </a:rPr>
               <a:pPr/>
-              <a:t>2/9/2017</a:t>
+              <a:t>2/10/2017</a:t>
             </a:fld>
             <a:endParaRPr lang="en-US" dirty="0">
               <a:solidFill>
@@ -11741,7 +11741,7 @@
                 </a:solidFill>
               </a:rPr>
               <a:pPr/>
-              <a:t>2/9/2017</a:t>
+              <a:t>2/10/2017</a:t>
             </a:fld>
             <a:endParaRPr lang="en-US" dirty="0">
               <a:solidFill>
@@ -28645,7 +28645,7 @@
       </p:sp>
       <p:pic>
         <p:nvPicPr>
-          <p:cNvPr id="12" name="Picture 11"/>
+          <p:cNvPr id="5" name="图片 4"/>
           <p:cNvPicPr>
             <a:picLocks noChangeAspect="1"/>
           </p:cNvPicPr>
@@ -28659,8 +28659,8 @@
         </p:blipFill>
         <p:spPr>
           <a:xfrm>
-            <a:off x="6523037" y="2030412"/>
-            <a:ext cx="5318811" cy="1847850"/>
+            <a:off x="6599237" y="2049462"/>
+            <a:ext cx="3123809" cy="1228571"/>
           </a:xfrm>
           <a:prstGeom prst="rect">
             <a:avLst/>
@@ -32066,7 +32066,7 @@
       </p:sp>
       <p:pic>
         <p:nvPicPr>
-          <p:cNvPr id="12" name="Picture 11"/>
+          <p:cNvPr id="2" name="图片 1"/>
           <p:cNvPicPr>
             <a:picLocks noChangeAspect="1"/>
           </p:cNvPicPr>
@@ -32080,8 +32080,8 @@
         </p:blipFill>
         <p:spPr>
           <a:xfrm>
-            <a:off x="6523037" y="2030412"/>
-            <a:ext cx="5318811" cy="1847850"/>
+            <a:off x="6599237" y="2049462"/>
+            <a:ext cx="3123809" cy="1228571"/>
           </a:xfrm>
           <a:prstGeom prst="rect">
             <a:avLst/>
@@ -34848,6 +34848,21 @@
 </file>
 
 <file path=customXml/item1.xml><?xml version="1.0" encoding="utf-8"?>
+<?mso-contentType ?>
+<FormTemplates xmlns="http://schemas.microsoft.com/sharepoint/v3/contenttype/forms">
+  <Display>DocumentLibraryForm</Display>
+  <Edit>DocumentLibraryForm</Edit>
+  <New>DocumentLibraryForm</New>
+</FormTemplates>
+</file>
+
+<file path=customXml/item2.xml><?xml version="1.0" encoding="utf-8"?>
+<p:properties xmlns:p="http://schemas.microsoft.com/office/2006/metadata/properties" xmlns:xsi="http://www.w3.org/2001/XMLSchema-instance" xmlns:pc="http://schemas.microsoft.com/office/infopath/2007/PartnerControls">
+  <documentManagement/>
+</p:properties>
+</file>
+
+<file path=customXml/item3.xml><?xml version="1.0" encoding="utf-8"?>
 <ct:contentTypeSchema xmlns:ct="http://schemas.microsoft.com/office/2006/metadata/contentType" xmlns:ma="http://schemas.microsoft.com/office/2006/metadata/properties/metaAttributes" ct:_="" ma:_="" ma:contentTypeName="Document" ma:contentTypeID="0x01010053433B08FA9EE742BB667ECEF5AA0226" ma:contentTypeVersion="4" ma:contentTypeDescription="Create a new document." ma:contentTypeScope="" ma:versionID="898350153c3cb7409c9d00c11df4aa1a">
   <xsd:schema xmlns:xsd="http://www.w3.org/2001/XMLSchema" xmlns:xs="http://www.w3.org/2001/XMLSchema" xmlns:p="http://schemas.microsoft.com/office/2006/metadata/properties" xmlns:ns2="09eba053-c572-4474-974d-b0bef0e9174f" targetNamespace="http://schemas.microsoft.com/office/2006/metadata/properties" ma:root="true" ma:fieldsID="f69afda497831ad76ed280df00c0bf48" ns2:_="">
     <xsd:import namespace="09eba053-c572-4474-974d-b0bef0e9174f"/>
@@ -35009,22 +35024,31 @@
 </ct:contentTypeSchema>
 </file>
 
-<file path=customXml/item2.xml><?xml version="1.0" encoding="utf-8"?>
-<?mso-contentType ?>
-<FormTemplates xmlns="http://schemas.microsoft.com/sharepoint/v3/contenttype/forms">
-  <Display>DocumentLibraryForm</Display>
-  <Edit>DocumentLibraryForm</Edit>
-  <New>DocumentLibraryForm</New>
-</FormTemplates>
+<file path=customXml/itemProps1.xml><?xml version="1.0" encoding="utf-8"?>
+<ds:datastoreItem xmlns:ds="http://schemas.openxmlformats.org/officeDocument/2006/customXml" ds:itemID="{41543473-98BF-41A8-AEE8-AF1C274C4DD8}">
+  <ds:schemaRefs>
+    <ds:schemaRef ds:uri="http://schemas.microsoft.com/sharepoint/v3/contenttype/forms"/>
+  </ds:schemaRefs>
+</ds:datastoreItem>
 </file>
 
-<file path=customXml/item3.xml><?xml version="1.0" encoding="utf-8"?>
-<p:properties xmlns:p="http://schemas.microsoft.com/office/2006/metadata/properties" xmlns:xsi="http://www.w3.org/2001/XMLSchema-instance" xmlns:pc="http://schemas.microsoft.com/office/infopath/2007/PartnerControls">
-  <documentManagement/>
-</p:properties>
+<file path=customXml/itemProps2.xml><?xml version="1.0" encoding="utf-8"?>
+<ds:datastoreItem xmlns:ds="http://schemas.openxmlformats.org/officeDocument/2006/customXml" ds:itemID="{479EF7F2-79F0-4950-9137-4016BE64CE46}">
+  <ds:schemaRefs>
+    <ds:schemaRef ds:uri="http://purl.org/dc/elements/1.1/"/>
+    <ds:schemaRef ds:uri="http://schemas.microsoft.com/office/2006/metadata/properties"/>
+    <ds:schemaRef ds:uri="09eba053-c572-4474-974d-b0bef0e9174f"/>
+    <ds:schemaRef ds:uri="http://schemas.microsoft.com/office/2006/documentManagement/types"/>
+    <ds:schemaRef ds:uri="http://purl.org/dc/terms/"/>
+    <ds:schemaRef ds:uri="http://schemas.openxmlformats.org/package/2006/metadata/core-properties"/>
+    <ds:schemaRef ds:uri="http://purl.org/dc/dcmitype/"/>
+    <ds:schemaRef ds:uri="http://schemas.microsoft.com/office/infopath/2007/PartnerControls"/>
+    <ds:schemaRef ds:uri="http://www.w3.org/XML/1998/namespace"/>
+  </ds:schemaRefs>
+</ds:datastoreItem>
 </file>
 
-<file path=customXml/itemProps1.xml><?xml version="1.0" encoding="utf-8"?>
+<file path=customXml/itemProps3.xml><?xml version="1.0" encoding="utf-8"?>
 <ds:datastoreItem xmlns:ds="http://schemas.openxmlformats.org/officeDocument/2006/customXml" ds:itemID="{55F7FE33-E5CA-47B4-B8F6-126891A96CF6}">
   <ds:schemaRefs>
     <ds:schemaRef ds:uri="http://schemas.microsoft.com/office/2006/metadata/contentType"/>
@@ -35040,28 +35064,4 @@
     <ds:schemaRef ds:uri="http://schemas.microsoft.com/internal/obd"/>
   </ds:schemaRefs>
 </ds:datastoreItem>
-</file>
-
-<file path=customXml/itemProps2.xml><?xml version="1.0" encoding="utf-8"?>
-<ds:datastoreItem xmlns:ds="http://schemas.openxmlformats.org/officeDocument/2006/customXml" ds:itemID="{41543473-98BF-41A8-AEE8-AF1C274C4DD8}">
-  <ds:schemaRefs>
-    <ds:schemaRef ds:uri="http://schemas.microsoft.com/sharepoint/v3/contenttype/forms"/>
-  </ds:schemaRefs>
-</ds:datastoreItem>
-</file>
-
-<file path=customXml/itemProps3.xml><?xml version="1.0" encoding="utf-8"?>
-<ds:datastoreItem xmlns:ds="http://schemas.openxmlformats.org/officeDocument/2006/customXml" ds:itemID="{479EF7F2-79F0-4950-9137-4016BE64CE46}">
-  <ds:schemaRefs>
-    <ds:schemaRef ds:uri="http://purl.org/dc/elements/1.1/"/>
-    <ds:schemaRef ds:uri="http://schemas.microsoft.com/office/2006/metadata/properties"/>
-    <ds:schemaRef ds:uri="09eba053-c572-4474-974d-b0bef0e9174f"/>
-    <ds:schemaRef ds:uri="http://schemas.microsoft.com/office/2006/documentManagement/types"/>
-    <ds:schemaRef ds:uri="http://purl.org/dc/terms/"/>
-    <ds:schemaRef ds:uri="http://schemas.openxmlformats.org/package/2006/metadata/core-properties"/>
-    <ds:schemaRef ds:uri="http://purl.org/dc/dcmitype/"/>
-    <ds:schemaRef ds:uri="http://schemas.microsoft.com/office/infopath/2007/PartnerControls"/>
-    <ds:schemaRef ds:uri="http://www.w3.org/XML/1998/namespace"/>
-  </ds:schemaRefs>
-</ds:datastoreItem>
 </file>
</xml_diff>

<commit_message>
Replace AAD endpoints with Graph API endpoints.  Remove Bing Maps requirement.
</commit_message>
<xml_diff>
--- a/EDU GRAPH-API Demo Script.pptx
+++ b/EDU GRAPH-API Demo Script.pptx
@@ -19,13 +19,13 @@
     <p:sldId id="335" r:id="rId10"/>
     <p:sldId id="302" r:id="rId11"/>
     <p:sldId id="303" r:id="rId12"/>
-    <p:sldId id="351" r:id="rId13"/>
-    <p:sldId id="304" r:id="rId14"/>
-    <p:sldId id="344" r:id="rId15"/>
-    <p:sldId id="345" r:id="rId16"/>
-    <p:sldId id="305" r:id="rId17"/>
-    <p:sldId id="337" r:id="rId18"/>
-    <p:sldId id="306" r:id="rId19"/>
+    <p:sldId id="304" r:id="rId13"/>
+    <p:sldId id="344" r:id="rId14"/>
+    <p:sldId id="345" r:id="rId15"/>
+    <p:sldId id="305" r:id="rId16"/>
+    <p:sldId id="337" r:id="rId17"/>
+    <p:sldId id="306" r:id="rId18"/>
+    <p:sldId id="355" r:id="rId19"/>
     <p:sldId id="352" r:id="rId20"/>
     <p:sldId id="307" r:id="rId21"/>
     <p:sldId id="334" r:id="rId22"/>
@@ -179,13 +179,13 @@
             <p14:sldId id="335"/>
             <p14:sldId id="302"/>
             <p14:sldId id="303"/>
-            <p14:sldId id="351"/>
             <p14:sldId id="304"/>
             <p14:sldId id="344"/>
             <p14:sldId id="345"/>
             <p14:sldId id="305"/>
             <p14:sldId id="337"/>
             <p14:sldId id="306"/>
+            <p14:sldId id="355"/>
             <p14:sldId id="352"/>
           </p14:sldIdLst>
         </p14:section>
@@ -285,8 +285,12 @@
 
 <file path=ppt/commentAuthors.xml><?xml version="1.0" encoding="utf-8"?>
 <p:cmAuthorLst xmlns:a="http://schemas.openxmlformats.org/drawingml/2006/main" xmlns:r="http://schemas.openxmlformats.org/officeDocument/2006/relationships" xmlns:p="http://schemas.openxmlformats.org/presentationml/2006/main">
-  <p:cmAuthor id="5" name="作者" initials="A" lastIdx="0" clrIdx="5"/>
+  <p:cmAuthor id="6" name="Author" initials="A" lastIdx="0" clrIdx="6"/>
 </p:cmAuthorLst>
+</file>
+
+<file path=ppt/revisionInfo.xml><?xml version="1.0" encoding="utf-8"?>
+<p1510:revInfo xmlns:a="http://schemas.openxmlformats.org/drawingml/2006/main" xmlns:r="http://schemas.openxmlformats.org/officeDocument/2006/relationships" xmlns:p1510="http://schemas.microsoft.com/office/powerpoint/2015/10/main"/>
 </file>
 
 <file path=ppt/handoutMasters/handoutMaster1.xml><?xml version="1.0" encoding="utf-8"?>
@@ -378,7 +382,7 @@
               <a:rPr lang="en-US" smtClean="0">
                 <a:latin typeface="Segoe UI" pitchFamily="34" charset="0"/>
               </a:rPr>
-              <a:t>2/10/2017 10:06 AM</a:t>
+              <a:t>8/4/2017 9:51 AM</a:t>
             </a:fld>
             <a:endParaRPr lang="en-US" dirty="0">
               <a:latin typeface="Segoe UI" pitchFamily="34" charset="0"/>
@@ -661,7 +665,7 @@
           <a:p>
             <a:fld id="{38EEC551-8CDA-4EB6-89BB-2A86C9F091C8}" type="datetime8">
               <a:rPr lang="en-US" smtClean="0"/>
-              <a:t>2/10/2017 10:06 AM</a:t>
+              <a:t>8/4/2017 9:51 AM</a:t>
             </a:fld>
             <a:endParaRPr lang="en-US" dirty="0"/>
           </a:p>
@@ -1025,7 +1029,7 @@
           <a:p>
             <a:fld id="{C6996B83-60CF-42A8-BA06-F99D0BEC30B3}" type="datetime1">
               <a:rPr lang="en-US" smtClean="0"/>
-              <a:t>2/10/2017</a:t>
+              <a:t>8/4/2017</a:t>
             </a:fld>
             <a:endParaRPr lang="en-US" dirty="0"/>
           </a:p>
@@ -1245,7 +1249,7 @@
                 </a:solidFill>
               </a:rPr>
               <a:pPr/>
-              <a:t>2/10/2017</a:t>
+              <a:t>8/4/2017</a:t>
             </a:fld>
             <a:endParaRPr lang="en-US" dirty="0">
               <a:solidFill>
@@ -1290,7 +1294,7 @@
     </p:spTree>
     <p:extLst>
       <p:ext uri="{BB962C8B-B14F-4D97-AF65-F5344CB8AC3E}">
-        <p14:creationId xmlns:p14="http://schemas.microsoft.com/office/powerpoint/2010/main" val="1597269258"/>
+        <p14:creationId xmlns:p14="http://schemas.microsoft.com/office/powerpoint/2010/main" val="2026973576"/>
       </p:ext>
     </p:extLst>
   </p:cSld>
@@ -1455,7 +1459,7 @@
                 </a:solidFill>
               </a:rPr>
               <a:pPr/>
-              <a:t>2/10/2017</a:t>
+              <a:t>8/4/2017</a:t>
             </a:fld>
             <a:endParaRPr lang="en-US" dirty="0">
               <a:solidFill>
@@ -1500,7 +1504,7 @@
     </p:spTree>
     <p:extLst>
       <p:ext uri="{BB962C8B-B14F-4D97-AF65-F5344CB8AC3E}">
-        <p14:creationId xmlns:p14="http://schemas.microsoft.com/office/powerpoint/2010/main" val="2026973576"/>
+        <p14:creationId xmlns:p14="http://schemas.microsoft.com/office/powerpoint/2010/main" val="2608144558"/>
       </p:ext>
     </p:extLst>
   </p:cSld>
@@ -1665,7 +1669,7 @@
                 </a:solidFill>
               </a:rPr>
               <a:pPr/>
-              <a:t>2/10/2017</a:t>
+              <a:t>8/4/2017</a:t>
             </a:fld>
             <a:endParaRPr lang="en-US" dirty="0">
               <a:solidFill>
@@ -1710,7 +1714,7 @@
     </p:spTree>
     <p:extLst>
       <p:ext uri="{BB962C8B-B14F-4D97-AF65-F5344CB8AC3E}">
-        <p14:creationId xmlns:p14="http://schemas.microsoft.com/office/powerpoint/2010/main" val="2608144558"/>
+        <p14:creationId xmlns:p14="http://schemas.microsoft.com/office/powerpoint/2010/main" val="3633352235"/>
       </p:ext>
     </p:extLst>
   </p:cSld>
@@ -1971,7 +1975,7 @@
                 <a:tabLst/>
                 <a:defRPr/>
               </a:pPr>
-              <a:t>2/10/2017</a:t>
+              <a:t>8/4/2017</a:t>
             </a:fld>
             <a:endParaRPr kumimoji="0" lang="en-US" sz="1800" b="0" i="0" u="none" strike="noStrike" kern="0" cap="none" spc="0" normalizeH="0" baseline="0" noProof="0" dirty="0">
               <a:ln>
@@ -2201,7 +2205,7 @@
                 </a:solidFill>
               </a:rPr>
               <a:pPr/>
-              <a:t>2/10/2017</a:t>
+              <a:t>8/4/2017</a:t>
             </a:fld>
             <a:endParaRPr lang="en-US" dirty="0">
               <a:solidFill>
@@ -2442,7 +2446,7 @@
                 </a:solidFill>
               </a:rPr>
               <a:pPr/>
-              <a:t>2/10/2017</a:t>
+              <a:t>8/4/2017</a:t>
             </a:fld>
             <a:endParaRPr lang="en-US" dirty="0">
               <a:solidFill>
@@ -2652,7 +2656,7 @@
                 </a:solidFill>
               </a:rPr>
               <a:pPr/>
-              <a:t>2/10/2017</a:t>
+              <a:t>8/4/2017</a:t>
             </a:fld>
             <a:endParaRPr lang="en-US" dirty="0">
               <a:solidFill>
@@ -2862,7 +2866,7 @@
                 </a:solidFill>
               </a:rPr>
               <a:pPr/>
-              <a:t>2/10/2017</a:t>
+              <a:t>8/4/2017</a:t>
             </a:fld>
             <a:endParaRPr lang="en-US" dirty="0">
               <a:solidFill>
@@ -3072,7 +3076,7 @@
                 </a:solidFill>
               </a:rPr>
               <a:pPr/>
-              <a:t>2/10/2017</a:t>
+              <a:t>8/4/2017</a:t>
             </a:fld>
             <a:endParaRPr lang="en-US" dirty="0">
               <a:solidFill>
@@ -3282,7 +3286,7 @@
                 </a:solidFill>
               </a:rPr>
               <a:pPr/>
-              <a:t>2/10/2017</a:t>
+              <a:t>8/4/2017</a:t>
             </a:fld>
             <a:endParaRPr lang="en-US" dirty="0">
               <a:solidFill>
@@ -3456,7 +3460,7 @@
           <a:p>
             <a:fld id="{B079C3B8-7366-4A44-A34B-3977080C19E7}" type="datetime1">
               <a:rPr lang="en-US" smtClean="0"/>
-              <a:t>2/10/2017</a:t>
+              <a:t>8/4/2017</a:t>
             </a:fld>
             <a:endParaRPr lang="en-US" dirty="0"/>
           </a:p>
@@ -3677,7 +3681,7 @@
                 </a:solidFill>
               </a:rPr>
               <a:pPr/>
-              <a:t>2/10/2017</a:t>
+              <a:t>8/4/2017</a:t>
             </a:fld>
             <a:endParaRPr lang="en-US" dirty="0">
               <a:solidFill>
@@ -3983,7 +3987,7 @@
                 <a:tabLst/>
                 <a:defRPr/>
               </a:pPr>
-              <a:t>2/10/2017</a:t>
+              <a:t>8/4/2017</a:t>
             </a:fld>
             <a:endParaRPr kumimoji="0" lang="en-US" sz="1800" b="0" i="0" u="none" strike="noStrike" kern="0" cap="none" spc="0" normalizeH="0" baseline="0" noProof="0" dirty="0">
               <a:ln>
@@ -4213,7 +4217,7 @@
                 </a:solidFill>
               </a:rPr>
               <a:pPr/>
-              <a:t>2/10/2017</a:t>
+              <a:t>8/4/2017</a:t>
             </a:fld>
             <a:endParaRPr lang="en-US" dirty="0">
               <a:solidFill>
@@ -4454,7 +4458,7 @@
                 </a:solidFill>
               </a:rPr>
               <a:pPr/>
-              <a:t>2/10/2017</a:t>
+              <a:t>8/4/2017</a:t>
             </a:fld>
             <a:endParaRPr lang="en-US" dirty="0">
               <a:solidFill>
@@ -4664,7 +4668,7 @@
                 </a:solidFill>
               </a:rPr>
               <a:pPr/>
-              <a:t>2/10/2017</a:t>
+              <a:t>8/4/2017</a:t>
             </a:fld>
             <a:endParaRPr lang="en-US" dirty="0">
               <a:solidFill>
@@ -4874,7 +4878,7 @@
                 </a:solidFill>
               </a:rPr>
               <a:pPr/>
-              <a:t>2/10/2017</a:t>
+              <a:t>8/4/2017</a:t>
             </a:fld>
             <a:endParaRPr lang="en-US" dirty="0">
               <a:solidFill>
@@ -5084,7 +5088,7 @@
                 </a:solidFill>
               </a:rPr>
               <a:pPr/>
-              <a:t>2/10/2017</a:t>
+              <a:t>8/4/2017</a:t>
             </a:fld>
             <a:endParaRPr lang="en-US" dirty="0">
               <a:solidFill>
@@ -5294,7 +5298,7 @@
                 </a:solidFill>
               </a:rPr>
               <a:pPr/>
-              <a:t>2/10/2017</a:t>
+              <a:t>8/4/2017</a:t>
             </a:fld>
             <a:endParaRPr lang="en-US" dirty="0">
               <a:solidFill>
@@ -5504,7 +5508,7 @@
                 </a:solidFill>
               </a:rPr>
               <a:pPr/>
-              <a:t>2/10/2017</a:t>
+              <a:t>8/4/2017</a:t>
             </a:fld>
             <a:endParaRPr lang="en-US" dirty="0">
               <a:solidFill>
@@ -5810,7 +5814,7 @@
                 <a:tabLst/>
                 <a:defRPr/>
               </a:pPr>
-              <a:t>2/10/2017</a:t>
+              <a:t>8/4/2017</a:t>
             </a:fld>
             <a:endParaRPr kumimoji="0" lang="en-US" sz="1800" b="0" i="0" u="none" strike="noStrike" kern="0" cap="none" spc="0" normalizeH="0" baseline="0" noProof="0" dirty="0">
               <a:ln>
@@ -6040,7 +6044,7 @@
                 </a:solidFill>
               </a:rPr>
               <a:pPr/>
-              <a:t>2/10/2017</a:t>
+              <a:t>8/4/2017</a:t>
             </a:fld>
             <a:endParaRPr lang="en-US" dirty="0">
               <a:solidFill>
@@ -6250,7 +6254,7 @@
                 </a:solidFill>
               </a:rPr>
               <a:pPr/>
-              <a:t>2/10/2017</a:t>
+              <a:t>8/4/2017</a:t>
             </a:fld>
             <a:endParaRPr lang="en-US" dirty="0">
               <a:solidFill>
@@ -6491,7 +6495,7 @@
                 </a:solidFill>
               </a:rPr>
               <a:pPr/>
-              <a:t>2/10/2017</a:t>
+              <a:t>8/4/2017</a:t>
             </a:fld>
             <a:endParaRPr lang="en-US" dirty="0">
               <a:solidFill>
@@ -6670,7 +6674,7 @@
                 </a:solidFill>
               </a:rPr>
               <a:pPr/>
-              <a:t>2/10/2017</a:t>
+              <a:t>8/4/2017</a:t>
             </a:fld>
             <a:endParaRPr lang="en-US" dirty="0">
               <a:solidFill>
@@ -6911,7 +6915,7 @@
                 </a:solidFill>
               </a:rPr>
               <a:pPr/>
-              <a:t>2/10/2017</a:t>
+              <a:t>8/4/2017</a:t>
             </a:fld>
             <a:endParaRPr lang="en-US" dirty="0">
               <a:solidFill>
@@ -7121,7 +7125,7 @@
                 </a:solidFill>
               </a:rPr>
               <a:pPr/>
-              <a:t>2/10/2017</a:t>
+              <a:t>8/4/2017</a:t>
             </a:fld>
             <a:endParaRPr lang="en-US" dirty="0">
               <a:solidFill>
@@ -7300,7 +7304,7 @@
                 </a:solidFill>
               </a:rPr>
               <a:pPr/>
-              <a:t>2/10/2017</a:t>
+              <a:t>8/4/2017</a:t>
             </a:fld>
             <a:endParaRPr lang="en-US" dirty="0">
               <a:solidFill>
@@ -7541,7 +7545,7 @@
                 </a:solidFill>
               </a:rPr>
               <a:pPr/>
-              <a:t>2/10/2017</a:t>
+              <a:t>8/4/2017</a:t>
             </a:fld>
             <a:endParaRPr lang="en-US" dirty="0">
               <a:solidFill>
@@ -7751,7 +7755,7 @@
                 </a:solidFill>
               </a:rPr>
               <a:pPr/>
-              <a:t>2/10/2017</a:t>
+              <a:t>8/4/2017</a:t>
             </a:fld>
             <a:endParaRPr lang="en-US" dirty="0">
               <a:solidFill>
@@ -7961,7 +7965,7 @@
                 </a:solidFill>
               </a:rPr>
               <a:pPr/>
-              <a:t>2/10/2017</a:t>
+              <a:t>8/4/2017</a:t>
             </a:fld>
             <a:endParaRPr lang="en-US" dirty="0">
               <a:solidFill>
@@ -8140,7 +8144,7 @@
                 </a:solidFill>
               </a:rPr>
               <a:pPr/>
-              <a:t>2/10/2017</a:t>
+              <a:t>8/4/2017</a:t>
             </a:fld>
             <a:endParaRPr lang="en-US" dirty="0">
               <a:solidFill>
@@ -8381,7 +8385,7 @@
                 </a:solidFill>
               </a:rPr>
               <a:pPr/>
-              <a:t>2/10/2017</a:t>
+              <a:t>8/4/2017</a:t>
             </a:fld>
             <a:endParaRPr lang="en-US" dirty="0">
               <a:solidFill>
@@ -8591,7 +8595,7 @@
                 </a:solidFill>
               </a:rPr>
               <a:pPr/>
-              <a:t>2/10/2017</a:t>
+              <a:t>8/4/2017</a:t>
             </a:fld>
             <a:endParaRPr lang="en-US" dirty="0">
               <a:solidFill>
@@ -8770,7 +8774,7 @@
                 </a:solidFill>
               </a:rPr>
               <a:pPr/>
-              <a:t>2/10/2017</a:t>
+              <a:t>8/4/2017</a:t>
             </a:fld>
             <a:endParaRPr lang="en-US" dirty="0">
               <a:solidFill>
@@ -9011,7 +9015,7 @@
                 </a:solidFill>
               </a:rPr>
               <a:pPr/>
-              <a:t>2/10/2017</a:t>
+              <a:t>8/4/2017</a:t>
             </a:fld>
             <a:endParaRPr lang="en-US" dirty="0">
               <a:solidFill>
@@ -9190,7 +9194,7 @@
                 </a:solidFill>
               </a:rPr>
               <a:pPr/>
-              <a:t>2/10/2017</a:t>
+              <a:t>8/4/2017</a:t>
             </a:fld>
             <a:endParaRPr lang="en-US" dirty="0">
               <a:solidFill>
@@ -9431,7 +9435,7 @@
                 </a:solidFill>
               </a:rPr>
               <a:pPr/>
-              <a:t>2/10/2017</a:t>
+              <a:t>8/4/2017</a:t>
             </a:fld>
             <a:endParaRPr lang="en-US" dirty="0">
               <a:solidFill>
@@ -9641,7 +9645,7 @@
                 </a:solidFill>
               </a:rPr>
               <a:pPr/>
-              <a:t>2/10/2017</a:t>
+              <a:t>8/4/2017</a:t>
             </a:fld>
             <a:endParaRPr lang="en-US" dirty="0">
               <a:solidFill>
@@ -9851,7 +9855,7 @@
                 </a:solidFill>
               </a:rPr>
               <a:pPr/>
-              <a:t>2/10/2017</a:t>
+              <a:t>8/4/2017</a:t>
             </a:fld>
             <a:endParaRPr lang="en-US" dirty="0">
               <a:solidFill>
@@ -10061,7 +10065,7 @@
                 </a:solidFill>
               </a:rPr>
               <a:pPr/>
-              <a:t>2/10/2017</a:t>
+              <a:t>8/4/2017</a:t>
             </a:fld>
             <a:endParaRPr lang="en-US" dirty="0">
               <a:solidFill>
@@ -10271,7 +10275,7 @@
                 </a:solidFill>
               </a:rPr>
               <a:pPr/>
-              <a:t>2/10/2017</a:t>
+              <a:t>8/4/2017</a:t>
             </a:fld>
             <a:endParaRPr lang="en-US" dirty="0">
               <a:solidFill>
@@ -10481,7 +10485,7 @@
                 </a:solidFill>
               </a:rPr>
               <a:pPr/>
-              <a:t>2/10/2017</a:t>
+              <a:t>8/4/2017</a:t>
             </a:fld>
             <a:endParaRPr lang="en-US" dirty="0">
               <a:solidFill>
@@ -10691,7 +10695,7 @@
                 </a:solidFill>
               </a:rPr>
               <a:pPr/>
-              <a:t>2/10/2017</a:t>
+              <a:t>8/4/2017</a:t>
             </a:fld>
             <a:endParaRPr lang="en-US" dirty="0">
               <a:solidFill>
@@ -10901,7 +10905,7 @@
                 </a:solidFill>
               </a:rPr>
               <a:pPr/>
-              <a:t>2/10/2017</a:t>
+              <a:t>8/4/2017</a:t>
             </a:fld>
             <a:endParaRPr lang="en-US" dirty="0">
               <a:solidFill>
@@ -11111,7 +11115,7 @@
                 </a:solidFill>
               </a:rPr>
               <a:pPr/>
-              <a:t>2/10/2017</a:t>
+              <a:t>8/4/2017</a:t>
             </a:fld>
             <a:endParaRPr lang="en-US" dirty="0">
               <a:solidFill>
@@ -11156,7 +11160,7 @@
     </p:spTree>
     <p:extLst>
       <p:ext uri="{BB962C8B-B14F-4D97-AF65-F5344CB8AC3E}">
-        <p14:creationId xmlns:p14="http://schemas.microsoft.com/office/powerpoint/2010/main" val="1960742941"/>
+        <p14:creationId xmlns:p14="http://schemas.microsoft.com/office/powerpoint/2010/main" val="317740385"/>
       </p:ext>
     </p:extLst>
   </p:cSld>
@@ -11321,7 +11325,7 @@
                 </a:solidFill>
               </a:rPr>
               <a:pPr/>
-              <a:t>2/10/2017</a:t>
+              <a:t>8/4/2017</a:t>
             </a:fld>
             <a:endParaRPr lang="en-US" dirty="0">
               <a:solidFill>
@@ -11366,7 +11370,7 @@
     </p:spTree>
     <p:extLst>
       <p:ext uri="{BB962C8B-B14F-4D97-AF65-F5344CB8AC3E}">
-        <p14:creationId xmlns:p14="http://schemas.microsoft.com/office/powerpoint/2010/main" val="317740385"/>
+        <p14:creationId xmlns:p14="http://schemas.microsoft.com/office/powerpoint/2010/main" val="3822678047"/>
       </p:ext>
     </p:extLst>
   </p:cSld>
@@ -11531,7 +11535,7 @@
                 </a:solidFill>
               </a:rPr>
               <a:pPr/>
-              <a:t>2/10/2017</a:t>
+              <a:t>8/4/2017</a:t>
             </a:fld>
             <a:endParaRPr lang="en-US" dirty="0">
               <a:solidFill>
@@ -11576,7 +11580,7 @@
     </p:spTree>
     <p:extLst>
       <p:ext uri="{BB962C8B-B14F-4D97-AF65-F5344CB8AC3E}">
-        <p14:creationId xmlns:p14="http://schemas.microsoft.com/office/powerpoint/2010/main" val="3822678047"/>
+        <p14:creationId xmlns:p14="http://schemas.microsoft.com/office/powerpoint/2010/main" val="3626112180"/>
       </p:ext>
     </p:extLst>
   </p:cSld>
@@ -11741,7 +11745,7 @@
                 </a:solidFill>
               </a:rPr>
               <a:pPr/>
-              <a:t>2/10/2017</a:t>
+              <a:t>8/4/2017</a:t>
             </a:fld>
             <a:endParaRPr lang="en-US" dirty="0">
               <a:solidFill>
@@ -11786,7 +11790,7 @@
     </p:spTree>
     <p:extLst>
       <p:ext uri="{BB962C8B-B14F-4D97-AF65-F5344CB8AC3E}">
-        <p14:creationId xmlns:p14="http://schemas.microsoft.com/office/powerpoint/2010/main" val="3626112180"/>
+        <p14:creationId xmlns:p14="http://schemas.microsoft.com/office/powerpoint/2010/main" val="1597269258"/>
       </p:ext>
     </p:extLst>
   </p:cSld>
@@ -26350,143 +26354,6 @@
       </p:grpSpPr>
       <p:sp>
         <p:nvSpPr>
-          <p:cNvPr id="2" name="Text Placeholder 1"/>
-          <p:cNvSpPr>
-            <a:spLocks noGrp="1"/>
-          </p:cNvSpPr>
-          <p:nvPr>
-            <p:ph type="body" sz="quarter" idx="15"/>
-          </p:nvPr>
-        </p:nvSpPr>
-        <p:spPr>
-          <a:xfrm>
-            <a:off x="5753412" y="1668463"/>
-            <a:ext cx="5865037" cy="3505200"/>
-          </a:xfrm>
-        </p:spPr>
-        <p:txBody>
-          <a:bodyPr/>
-          <a:lstStyle/>
-          <a:p>
-            <a:pPr marL="571500" indent="-571500">
-              <a:buFont typeface="Arial" panose="020B0604020202020204" pitchFamily="34" charset="0"/>
-              <a:buChar char="•"/>
-            </a:pPr>
-            <a:r>
-              <a:rPr lang="en-US" dirty="0"/>
-              <a:t>Admin needs to consent when first go to admin panel.</a:t>
-            </a:r>
-          </a:p>
-          <a:p>
-            <a:pPr marL="571500" indent="-571500">
-              <a:buFont typeface="Arial" panose="020B0604020202020204" pitchFamily="34" charset="0"/>
-              <a:buChar char="•"/>
-            </a:pPr>
-            <a:r>
-              <a:rPr lang="en-US" dirty="0"/>
-              <a:t>Click </a:t>
-            </a:r>
-            <a:r>
-              <a:rPr lang="en-US" b="1" dirty="0"/>
-              <a:t>Consent</a:t>
-            </a:r>
-            <a:r>
-              <a:rPr lang="en-US" dirty="0"/>
-              <a:t> button to login and accept and then consent success. </a:t>
-            </a:r>
-          </a:p>
-        </p:txBody>
-      </p:sp>
-      <p:sp>
-        <p:nvSpPr>
-          <p:cNvPr id="3" name="Title 2"/>
-          <p:cNvSpPr>
-            <a:spLocks noGrp="1"/>
-          </p:cNvSpPr>
-          <p:nvPr>
-            <p:ph type="title"/>
-          </p:nvPr>
-        </p:nvSpPr>
-        <p:spPr/>
-        <p:txBody>
-          <a:bodyPr/>
-          <a:lstStyle/>
-          <a:p>
-            <a:r>
-              <a:rPr lang="en-US" dirty="0"/>
-              <a:t>Admin Panel</a:t>
-            </a:r>
-          </a:p>
-        </p:txBody>
-      </p:sp>
-      <p:pic>
-        <p:nvPicPr>
-          <p:cNvPr id="5" name="Picture 4"/>
-          <p:cNvPicPr>
-            <a:picLocks noChangeAspect="1"/>
-          </p:cNvPicPr>
-          <p:nvPr/>
-        </p:nvPicPr>
-        <p:blipFill>
-          <a:blip r:embed="rId3"/>
-          <a:stretch>
-            <a:fillRect/>
-          </a:stretch>
-        </p:blipFill>
-        <p:spPr>
-          <a:xfrm>
-            <a:off x="282576" y="1592263"/>
-            <a:ext cx="5470836" cy="1828800"/>
-          </a:xfrm>
-          <a:prstGeom prst="rect">
-            <a:avLst/>
-          </a:prstGeom>
-        </p:spPr>
-      </p:pic>
-    </p:spTree>
-    <p:extLst>
-      <p:ext uri="{BB962C8B-B14F-4D97-AF65-F5344CB8AC3E}">
-        <p14:creationId xmlns:p14="http://schemas.microsoft.com/office/powerpoint/2010/main" val="1906374937"/>
-      </p:ext>
-    </p:extLst>
-  </p:cSld>
-  <p:clrMapOvr>
-    <a:masterClrMapping/>
-  </p:clrMapOvr>
-  <mc:AlternateContent xmlns:mc="http://schemas.openxmlformats.org/markup-compatibility/2006" xmlns:p14="http://schemas.microsoft.com/office/powerpoint/2010/main">
-    <mc:Choice Requires="p14">
-      <p:transition spd="med" p14:dur="700">
-        <p:fade/>
-      </p:transition>
-    </mc:Choice>
-    <mc:Fallback xmlns="">
-      <p:transition spd="med">
-        <p:fade/>
-      </p:transition>
-    </mc:Fallback>
-  </mc:AlternateContent>
-</p:sld>
-</file>
-
-<file path=ppt/slides/slide11.xml><?xml version="1.0" encoding="utf-8"?>
-<p:sld xmlns:a="http://schemas.openxmlformats.org/drawingml/2006/main" xmlns:r="http://schemas.openxmlformats.org/officeDocument/2006/relationships" xmlns:p="http://schemas.openxmlformats.org/presentationml/2006/main">
-  <p:cSld>
-    <p:spTree>
-      <p:nvGrpSpPr>
-        <p:cNvPr id="1" name=""/>
-        <p:cNvGrpSpPr/>
-        <p:nvPr/>
-      </p:nvGrpSpPr>
-      <p:grpSpPr>
-        <a:xfrm>
-          <a:off x="0" y="0"/>
-          <a:ext cx="0" cy="0"/>
-          <a:chOff x="0" y="0"/>
-          <a:chExt cx="0" cy="0"/>
-        </a:xfrm>
-      </p:grpSpPr>
-      <p:sp>
-        <p:nvSpPr>
           <p:cNvPr id="3" name="Title 2"/>
           <p:cNvSpPr>
             <a:spLocks noGrp="1"/>
@@ -26592,7 +26459,7 @@
 </p:sld>
 </file>
 
-<file path=ppt/slides/slide12.xml><?xml version="1.0" encoding="utf-8"?>
+<file path=ppt/slides/slide11.xml><?xml version="1.0" encoding="utf-8"?>
 <p:sld xmlns:a="http://schemas.openxmlformats.org/drawingml/2006/main" xmlns:r="http://schemas.openxmlformats.org/officeDocument/2006/relationships" xmlns:p="http://schemas.openxmlformats.org/presentationml/2006/main">
   <p:cSld>
     <p:spTree>
@@ -26736,7 +26603,7 @@
 </p:sld>
 </file>
 
-<file path=ppt/slides/slide13.xml><?xml version="1.0" encoding="utf-8"?>
+<file path=ppt/slides/slide12.xml><?xml version="1.0" encoding="utf-8"?>
 <p:sld xmlns:a="http://schemas.openxmlformats.org/drawingml/2006/main" xmlns:r="http://schemas.openxmlformats.org/officeDocument/2006/relationships" xmlns:p="http://schemas.openxmlformats.org/presentationml/2006/main">
   <p:cSld>
     <p:spTree>
@@ -26859,6 +26726,151 @@
     <p:extLst>
       <p:ext uri="{BB962C8B-B14F-4D97-AF65-F5344CB8AC3E}">
         <p14:creationId xmlns:p14="http://schemas.microsoft.com/office/powerpoint/2010/main" val="1187192620"/>
+      </p:ext>
+    </p:extLst>
+  </p:cSld>
+  <p:clrMapOvr>
+    <a:masterClrMapping/>
+  </p:clrMapOvr>
+  <mc:AlternateContent xmlns:mc="http://schemas.openxmlformats.org/markup-compatibility/2006" xmlns:p14="http://schemas.microsoft.com/office/powerpoint/2010/main">
+    <mc:Choice Requires="p14">
+      <p:transition spd="med" p14:dur="700">
+        <p:fade/>
+      </p:transition>
+    </mc:Choice>
+    <mc:Fallback xmlns="">
+      <p:transition spd="med">
+        <p:fade/>
+      </p:transition>
+    </mc:Fallback>
+  </mc:AlternateContent>
+</p:sld>
+</file>
+
+<file path=ppt/slides/slide13.xml><?xml version="1.0" encoding="utf-8"?>
+<p:sld xmlns:a="http://schemas.openxmlformats.org/drawingml/2006/main" xmlns:r="http://schemas.openxmlformats.org/officeDocument/2006/relationships" xmlns:p="http://schemas.openxmlformats.org/presentationml/2006/main">
+  <p:cSld>
+    <p:spTree>
+      <p:nvGrpSpPr>
+        <p:cNvPr id="1" name=""/>
+        <p:cNvGrpSpPr/>
+        <p:nvPr/>
+      </p:nvGrpSpPr>
+      <p:grpSpPr>
+        <a:xfrm>
+          <a:off x="0" y="0"/>
+          <a:ext cx="0" cy="0"/>
+          <a:chOff x="0" y="0"/>
+          <a:chExt cx="0" cy="0"/>
+        </a:xfrm>
+      </p:grpSpPr>
+      <p:sp>
+        <p:nvSpPr>
+          <p:cNvPr id="2" name="Text Placeholder 1"/>
+          <p:cNvSpPr>
+            <a:spLocks noGrp="1"/>
+          </p:cNvSpPr>
+          <p:nvPr>
+            <p:ph type="body" sz="quarter" idx="15"/>
+          </p:nvPr>
+        </p:nvSpPr>
+        <p:spPr>
+          <a:xfrm>
+            <a:off x="503237" y="1744662"/>
+            <a:ext cx="11122837" cy="3505200"/>
+          </a:xfrm>
+        </p:spPr>
+        <p:txBody>
+          <a:bodyPr/>
+          <a:lstStyle/>
+          <a:p>
+            <a:pPr marL="571500" indent="-571500">
+              <a:buFont typeface="Arial" panose="020B0604020202020204" pitchFamily="34" charset="0"/>
+              <a:buChar char="•"/>
+            </a:pPr>
+            <a:r>
+              <a:rPr lang="en-US" dirty="0"/>
+              <a:t>Admin can click </a:t>
+            </a:r>
+            <a:r>
+              <a:rPr lang="en-US" b="1" dirty="0"/>
+              <a:t>Clear Login Cache</a:t>
+            </a:r>
+            <a:r>
+              <a:rPr lang="en-US" dirty="0"/>
+              <a:t> button to reset a login cache.</a:t>
+            </a:r>
+          </a:p>
+          <a:p>
+            <a:pPr marL="571500" indent="-571500">
+              <a:buFont typeface="Arial" panose="020B0604020202020204" pitchFamily="34" charset="0"/>
+              <a:buChar char="•"/>
+            </a:pPr>
+            <a:endParaRPr lang="en-US" dirty="0"/>
+          </a:p>
+        </p:txBody>
+      </p:sp>
+      <p:sp>
+        <p:nvSpPr>
+          <p:cNvPr id="3" name="Title 2"/>
+          <p:cNvSpPr>
+            <a:spLocks noGrp="1"/>
+          </p:cNvSpPr>
+          <p:nvPr>
+            <p:ph type="title"/>
+          </p:nvPr>
+        </p:nvSpPr>
+        <p:spPr/>
+        <p:txBody>
+          <a:bodyPr/>
+          <a:lstStyle/>
+          <a:p>
+            <a:r>
+              <a:rPr lang="en-US" dirty="0"/>
+              <a:t>Admin Panel – </a:t>
+            </a:r>
+            <a:r>
+              <a:rPr lang="en-US" altLang="zh-CN" dirty="0"/>
+              <a:t>Clear Login Cache</a:t>
+            </a:r>
+            <a:endParaRPr lang="en-US" dirty="0"/>
+          </a:p>
+        </p:txBody>
+      </p:sp>
+      <p:pic>
+        <p:nvPicPr>
+          <p:cNvPr id="4" name="Picture 3">
+            <a:extLst>
+              <a:ext uri="{FF2B5EF4-FFF2-40B4-BE49-F238E27FC236}">
+                <a16:creationId xmlns:a16="http://schemas.microsoft.com/office/drawing/2014/main" id="{2A193D34-CB9E-48D8-A27B-56E645C93C7F}"/>
+              </a:ext>
+            </a:extLst>
+          </p:cNvPr>
+          <p:cNvPicPr>
+            <a:picLocks noChangeAspect="1"/>
+          </p:cNvPicPr>
+          <p:nvPr/>
+        </p:nvPicPr>
+        <p:blipFill>
+          <a:blip r:embed="rId3"/>
+          <a:stretch>
+            <a:fillRect/>
+          </a:stretch>
+        </p:blipFill>
+        <p:spPr>
+          <a:xfrm>
+            <a:off x="1189037" y="4259262"/>
+            <a:ext cx="8923809" cy="800000"/>
+          </a:xfrm>
+          <a:prstGeom prst="rect">
+            <a:avLst/>
+          </a:prstGeom>
+        </p:spPr>
+      </p:pic>
+    </p:spTree>
+    <p:extLst>
+      <p:ext uri="{BB962C8B-B14F-4D97-AF65-F5344CB8AC3E}">
+        <p14:creationId xmlns:p14="http://schemas.microsoft.com/office/powerpoint/2010/main" val="2846073434"/>
       </p:ext>
     </p:extLst>
   </p:cSld>
@@ -27534,7 +27546,7 @@
             </a:r>
             <a:r>
               <a:rPr lang="en-US" b="1" dirty="0"/>
-              <a:t>Use Existing O365 Account </a:t>
+              <a:t>Link to existing O365 account </a:t>
             </a:r>
             <a:r>
               <a:rPr lang="en-US" dirty="0"/>
@@ -28812,6 +28824,30 @@
           </a:prstGeom>
         </p:spPr>
       </p:pic>
+      <p:pic>
+        <p:nvPicPr>
+          <p:cNvPr id="7" name="Picture 6"/>
+          <p:cNvPicPr>
+            <a:picLocks noChangeAspect="1"/>
+          </p:cNvPicPr>
+          <p:nvPr/>
+        </p:nvPicPr>
+        <p:blipFill>
+          <a:blip r:embed="rId4"/>
+          <a:stretch>
+            <a:fillRect/>
+          </a:stretch>
+        </p:blipFill>
+        <p:spPr>
+          <a:xfrm>
+            <a:off x="350837" y="3754595"/>
+            <a:ext cx="4497015" cy="1647667"/>
+          </a:xfrm>
+          <a:prstGeom prst="rect">
+            <a:avLst/>
+          </a:prstGeom>
+        </p:spPr>
+      </p:pic>
     </p:spTree>
     <p:extLst>
       <p:ext uri="{BB962C8B-B14F-4D97-AF65-F5344CB8AC3E}">
@@ -29798,20 +29834,6 @@
           <a:p>
             <a:r>
               <a:rPr lang="en-US" sz="2800" dirty="0"/>
-              <a:t>Click the </a:t>
-            </a:r>
-            <a:r>
-              <a:rPr lang="en-US" sz="2800" b="1" dirty="0"/>
-              <a:t>Bing map icon </a:t>
-            </a:r>
-            <a:r>
-              <a:rPr lang="en-US" sz="2800" dirty="0"/>
-              <a:t>to show a map of the selected school. </a:t>
-            </a:r>
-          </a:p>
-          <a:p>
-            <a:r>
-              <a:rPr lang="en-US" sz="2800" dirty="0"/>
               <a:t>Click </a:t>
             </a:r>
             <a:r>
@@ -29849,7 +29871,13 @@
       </p:sp>
       <p:pic>
         <p:nvPicPr>
-          <p:cNvPr id="6" name="Picture 5"/>
+          <p:cNvPr id="4" name="Picture 3">
+            <a:extLst>
+              <a:ext uri="{FF2B5EF4-FFF2-40B4-BE49-F238E27FC236}">
+                <a16:creationId xmlns:a16="http://schemas.microsoft.com/office/drawing/2014/main" id="{24CE180C-8EA6-41DF-B235-126AFF042241}"/>
+              </a:ext>
+            </a:extLst>
+          </p:cNvPr>
           <p:cNvPicPr>
             <a:picLocks noChangeAspect="1"/>
           </p:cNvPicPr>
@@ -29863,8 +29891,8 @@
         </p:blipFill>
         <p:spPr>
           <a:xfrm>
-            <a:off x="1265237" y="4259262"/>
-            <a:ext cx="9047161" cy="2456691"/>
+            <a:off x="808037" y="3649662"/>
+            <a:ext cx="9158288" cy="3183111"/>
           </a:xfrm>
           <a:prstGeom prst="rect">
             <a:avLst/>
@@ -30673,7 +30701,7 @@
             </a:pPr>
             <a:r>
               <a:rPr lang="en-US" dirty="0"/>
-              <a:t>Other students’ seat will show with gray background color.</a:t>
+              <a:t>Other students’ seat will show with their own favorite color.</a:t>
             </a:r>
           </a:p>
           <a:p>
@@ -30709,7 +30737,7 @@
       </p:sp>
       <p:pic>
         <p:nvPicPr>
-          <p:cNvPr id="4" name="Picture 3"/>
+          <p:cNvPr id="5" name="Picture 4"/>
           <p:cNvPicPr>
             <a:picLocks noChangeAspect="1"/>
           </p:cNvPicPr>
@@ -30723,8 +30751,8 @@
         </p:blipFill>
         <p:spPr>
           <a:xfrm>
-            <a:off x="122237" y="1956709"/>
-            <a:ext cx="4794769" cy="1557105"/>
+            <a:off x="553966" y="1529355"/>
+            <a:ext cx="4554560" cy="1652334"/>
           </a:xfrm>
           <a:prstGeom prst="rect">
             <a:avLst/>
@@ -30855,7 +30883,7 @@
       </p:sp>
       <p:pic>
         <p:nvPicPr>
-          <p:cNvPr id="5" name="Picture 4"/>
+          <p:cNvPr id="4" name="Picture 3"/>
           <p:cNvPicPr>
             <a:picLocks noChangeAspect="1"/>
           </p:cNvPicPr>
@@ -30869,8 +30897,8 @@
         </p:blipFill>
         <p:spPr>
           <a:xfrm>
-            <a:off x="6827837" y="1516062"/>
-            <a:ext cx="4950188" cy="1478894"/>
+            <a:off x="6815604" y="1186983"/>
+            <a:ext cx="5154850" cy="1853080"/>
           </a:xfrm>
           <a:prstGeom prst="rect">
             <a:avLst/>
@@ -30879,7 +30907,7 @@
       </p:pic>
       <p:pic>
         <p:nvPicPr>
-          <p:cNvPr id="6" name="Picture 5"/>
+          <p:cNvPr id="7" name="Picture 6"/>
           <p:cNvPicPr>
             <a:picLocks noChangeAspect="1"/>
           </p:cNvPicPr>
@@ -30893,8 +30921,8 @@
         </p:blipFill>
         <p:spPr>
           <a:xfrm>
-            <a:off x="6827837" y="3691014"/>
-            <a:ext cx="5023733" cy="1596723"/>
+            <a:off x="6815605" y="3611562"/>
+            <a:ext cx="5147714" cy="1790700"/>
           </a:xfrm>
           <a:prstGeom prst="rect">
             <a:avLst/>
@@ -32914,7 +32942,7 @@
               <a:rPr lang="en-US" sz="2800" dirty="0">
                 <a:latin typeface="+mj-lt"/>
               </a:rPr>
-              <a:t>Admin can link use an existing local account.</a:t>
+              <a:t>Admin can link with an existing local account.</a:t>
             </a:r>
           </a:p>
           <a:p>
@@ -33023,27 +33051,73 @@
             <a:spLocks noGrp="1"/>
           </p:cNvSpPr>
           <p:nvPr>
-            <p:ph type="body" sz="quarter" idx="10"/>
+            <p:ph type="body" sz="quarter" idx="15"/>
           </p:nvPr>
         </p:nvSpPr>
         <p:spPr>
           <a:xfrm>
-            <a:off x="274639" y="1578611"/>
-            <a:ext cx="8778210" cy="1828799"/>
+            <a:off x="157386" y="2582862"/>
+            <a:ext cx="11813366" cy="914400"/>
           </a:xfrm>
         </p:spPr>
         <p:txBody>
           <a:bodyPr/>
           <a:lstStyle/>
           <a:p>
-            <a:pPr marL="0" indent="0">
-              <a:buNone/>
+            <a:pPr marL="571500" indent="-571500">
+              <a:buFont typeface="Arial" panose="020B0604020202020204" pitchFamily="34" charset="0"/>
+              <a:buChar char="•"/>
             </a:pPr>
             <a:r>
-              <a:rPr lang="en-US" sz="2800" dirty="0">
-                <a:latin typeface="+mj-lt"/>
-              </a:rPr>
-              <a:t>If a local account already exists with the same email as O365 email, Create Local Account will be disabled.</a:t>
+              <a:rPr lang="en-US" altLang="zh-CN" sz="3400" dirty="0"/>
+              <a:t>If a local account already exists with the same email as O365 email, </a:t>
+            </a:r>
+            <a:r>
+              <a:rPr lang="en-US" altLang="zh-CN" sz="3400" b="1" dirty="0"/>
+              <a:t>Continue with new Local Account </a:t>
+            </a:r>
+            <a:r>
+              <a:rPr lang="en-US" altLang="zh-CN" sz="3400" dirty="0"/>
+              <a:t>button will be disabled.</a:t>
+            </a:r>
+            <a:endParaRPr lang="en-US" sz="3400" dirty="0"/>
+          </a:p>
+          <a:p>
+            <a:pPr marL="571500" indent="-571500">
+              <a:buFont typeface="Arial" panose="020B0604020202020204" pitchFamily="34" charset="0"/>
+              <a:buChar char="•"/>
+            </a:pPr>
+            <a:r>
+              <a:rPr lang="en-US" sz="3400" dirty="0"/>
+              <a:t>If you have a local account, click </a:t>
+            </a:r>
+            <a:r>
+              <a:rPr lang="en-US" sz="3400" b="1" dirty="0"/>
+              <a:t>Link with existing Local Account</a:t>
+            </a:r>
+            <a:r>
+              <a:rPr lang="en-US" sz="3400" dirty="0"/>
+              <a:t> will link O365 account to local account.</a:t>
+            </a:r>
+          </a:p>
+          <a:p>
+            <a:pPr marL="571500" indent="-571500">
+              <a:buFont typeface="Arial" panose="020B0604020202020204" pitchFamily="34" charset="0"/>
+              <a:buChar char="•"/>
+            </a:pPr>
+            <a:r>
+              <a:rPr lang="en-US" sz="3400" dirty="0"/>
+              <a:t>After link succeed it will go to all schools page. </a:t>
+            </a:r>
+          </a:p>
+          <a:p>
+            <a:pPr marL="571500" indent="-571500">
+              <a:buFont typeface="Arial" panose="020B0604020202020204" pitchFamily="34" charset="0"/>
+              <a:buChar char="•"/>
+            </a:pPr>
+            <a:r>
+              <a:rPr lang="en-US" sz="3400" dirty="0"/>
+              <a:t>Admin can also go to admin panel on top navigation.</a:t>
             </a:r>
           </a:p>
         </p:txBody>
@@ -33058,21 +33132,26 @@
             <p:ph type="title"/>
           </p:nvPr>
         </p:nvSpPr>
-        <p:spPr/>
+        <p:spPr>
+          <a:xfrm>
+            <a:off x="46037" y="295274"/>
+            <a:ext cx="11889564" cy="917575"/>
+          </a:xfrm>
+        </p:spPr>
         <p:txBody>
           <a:bodyPr/>
           <a:lstStyle/>
           <a:p>
             <a:r>
               <a:rPr lang="en-US" dirty="0"/>
-              <a:t>If Account with Same Email Exists</a:t>
+              <a:t>Link the Admin Account to Existing Local Account</a:t>
             </a:r>
           </a:p>
         </p:txBody>
       </p:sp>
       <p:pic>
         <p:nvPicPr>
-          <p:cNvPr id="4" name="Picture 3"/>
+          <p:cNvPr id="5" name="Picture 4"/>
           <p:cNvPicPr>
             <a:picLocks noChangeAspect="1"/>
           </p:cNvPicPr>
@@ -33086,7 +33165,7 @@
         </p:blipFill>
         <p:spPr>
           <a:xfrm>
-            <a:off x="427037" y="3116262"/>
+            <a:off x="350837" y="5021262"/>
             <a:ext cx="7342857" cy="1771429"/>
           </a:xfrm>
           <a:prstGeom prst="rect">
@@ -33097,7 +33176,7 @@
     </p:spTree>
     <p:extLst>
       <p:ext uri="{BB962C8B-B14F-4D97-AF65-F5344CB8AC3E}">
-        <p14:creationId xmlns:p14="http://schemas.microsoft.com/office/powerpoint/2010/main" val="1863260617"/>
+        <p14:creationId xmlns:p14="http://schemas.microsoft.com/office/powerpoint/2010/main" val="939181562"/>
       </p:ext>
     </p:extLst>
   </p:cSld>
@@ -33138,93 +33217,73 @@
       </p:grpSpPr>
       <p:sp>
         <p:nvSpPr>
-          <p:cNvPr id="2" name="Text Placeholder 1"/>
-          <p:cNvSpPr>
-            <a:spLocks noGrp="1"/>
-          </p:cNvSpPr>
-          <p:nvPr>
-            <p:ph type="body" sz="quarter" idx="15"/>
+          <p:cNvPr id="3" name="Title 2"/>
+          <p:cNvSpPr>
+            <a:spLocks noGrp="1"/>
+          </p:cNvSpPr>
+          <p:nvPr>
+            <p:ph type="title"/>
+          </p:nvPr>
+        </p:nvSpPr>
+        <p:spPr/>
+        <p:txBody>
+          <a:bodyPr/>
+          <a:lstStyle/>
+          <a:p>
+            <a:r>
+              <a:rPr lang="en-US" dirty="0"/>
+              <a:t>Create Local account and Link</a:t>
+            </a:r>
+          </a:p>
+        </p:txBody>
+      </p:sp>
+      <p:sp>
+        <p:nvSpPr>
+          <p:cNvPr id="8" name="Text Placeholder 1"/>
+          <p:cNvSpPr>
+            <a:spLocks noGrp="1"/>
+          </p:cNvSpPr>
+          <p:nvPr>
+            <p:ph type="body" sz="quarter" idx="4294967295"/>
           </p:nvPr>
         </p:nvSpPr>
         <p:spPr>
           <a:xfrm>
-            <a:off x="157386" y="2125662"/>
-            <a:ext cx="11813366" cy="914400"/>
+            <a:off x="274640" y="1820862"/>
+            <a:ext cx="6248398" cy="4185761"/>
           </a:xfrm>
+          <a:prstGeom prst="rect">
+            <a:avLst/>
+          </a:prstGeom>
         </p:spPr>
         <p:txBody>
           <a:bodyPr/>
           <a:lstStyle/>
           <a:p>
-            <a:pPr marL="571500" indent="-571500">
-              <a:buFont typeface="Arial" panose="020B0604020202020204" pitchFamily="34" charset="0"/>
-              <a:buChar char="•"/>
-            </a:pPr>
             <a:r>
               <a:rPr lang="en-US" dirty="0"/>
-              <a:t>If you have a local account, click </a:t>
+              <a:t>If there’s no local account admin can create a new local account and then link.</a:t>
+            </a:r>
+          </a:p>
+          <a:p>
+            <a:r>
+              <a:rPr lang="en-US" dirty="0"/>
+              <a:t>Select favorite color and then click </a:t>
             </a:r>
             <a:r>
               <a:rPr lang="en-US" b="1" dirty="0"/>
-              <a:t>Link with existing Local Account</a:t>
+              <a:t>Create and Link</a:t>
             </a:r>
             <a:r>
               <a:rPr lang="en-US" dirty="0"/>
-              <a:t> will link O365 account to local account.</a:t>
-            </a:r>
-          </a:p>
-          <a:p>
-            <a:pPr marL="571500" indent="-571500">
-              <a:buFont typeface="Arial" panose="020B0604020202020204" pitchFamily="34" charset="0"/>
-              <a:buChar char="•"/>
-            </a:pPr>
-            <a:r>
-              <a:rPr lang="en-US" dirty="0"/>
-              <a:t>After link succeed it will go to all schools page. </a:t>
-            </a:r>
-          </a:p>
-          <a:p>
-            <a:pPr marL="571500" indent="-571500">
-              <a:buFont typeface="Arial" panose="020B0604020202020204" pitchFamily="34" charset="0"/>
-              <a:buChar char="•"/>
-            </a:pPr>
-            <a:r>
-              <a:rPr lang="en-US" dirty="0"/>
-              <a:t>Admin can also go to admin panel on top navigation.</a:t>
-            </a:r>
-          </a:p>
-        </p:txBody>
-      </p:sp>
-      <p:sp>
-        <p:nvSpPr>
-          <p:cNvPr id="3" name="Title 2"/>
-          <p:cNvSpPr>
-            <a:spLocks noGrp="1"/>
-          </p:cNvSpPr>
-          <p:nvPr>
-            <p:ph type="title"/>
-          </p:nvPr>
-        </p:nvSpPr>
-        <p:spPr>
-          <a:xfrm>
-            <a:off x="46037" y="295274"/>
-            <a:ext cx="11889564" cy="917575"/>
-          </a:xfrm>
-        </p:spPr>
-        <p:txBody>
-          <a:bodyPr/>
-          <a:lstStyle/>
-          <a:p>
-            <a:r>
-              <a:rPr lang="en-US" dirty="0"/>
-              <a:t>Link the Admin Account to Existing Local Account</a:t>
+              <a:t> button.</a:t>
             </a:r>
           </a:p>
         </p:txBody>
       </p:sp>
       <p:pic>
         <p:nvPicPr>
-          <p:cNvPr id="5" name="Picture 4"/>
+          <p:cNvPr id="4" name="Picture 3"/>
           <p:cNvPicPr>
             <a:picLocks noChangeAspect="1"/>
           </p:cNvPicPr>
@@ -33238,8 +33297,8 @@
         </p:blipFill>
         <p:spPr>
           <a:xfrm>
-            <a:off x="350837" y="4183062"/>
-            <a:ext cx="7342857" cy="1771429"/>
+            <a:off x="6549481" y="2125662"/>
+            <a:ext cx="4857143" cy="1542857"/>
           </a:xfrm>
           <a:prstGeom prst="rect">
             <a:avLst/>
@@ -33249,7 +33308,7 @@
     </p:spTree>
     <p:extLst>
       <p:ext uri="{BB962C8B-B14F-4D97-AF65-F5344CB8AC3E}">
-        <p14:creationId xmlns:p14="http://schemas.microsoft.com/office/powerpoint/2010/main" val="939181562"/>
+        <p14:creationId xmlns:p14="http://schemas.microsoft.com/office/powerpoint/2010/main" val="4154162200"/>
       </p:ext>
     </p:extLst>
   </p:cSld>
@@ -33290,73 +33349,78 @@
       </p:grpSpPr>
       <p:sp>
         <p:nvSpPr>
-          <p:cNvPr id="3" name="Title 2"/>
-          <p:cNvSpPr>
-            <a:spLocks noGrp="1"/>
-          </p:cNvSpPr>
-          <p:nvPr>
-            <p:ph type="title"/>
-          </p:nvPr>
-        </p:nvSpPr>
-        <p:spPr/>
-        <p:txBody>
-          <a:bodyPr/>
-          <a:lstStyle/>
-          <a:p>
-            <a:r>
-              <a:rPr lang="en-US" dirty="0"/>
-              <a:t>Create Local account and Link</a:t>
-            </a:r>
-          </a:p>
-        </p:txBody>
-      </p:sp>
-      <p:sp>
-        <p:nvSpPr>
-          <p:cNvPr id="8" name="Text Placeholder 1"/>
-          <p:cNvSpPr>
-            <a:spLocks noGrp="1"/>
-          </p:cNvSpPr>
-          <p:nvPr>
-            <p:ph type="body" sz="quarter" idx="4294967295"/>
+          <p:cNvPr id="2" name="Text Placeholder 1"/>
+          <p:cNvSpPr>
+            <a:spLocks noGrp="1"/>
+          </p:cNvSpPr>
+          <p:nvPr>
+            <p:ph type="body" sz="quarter" idx="15"/>
           </p:nvPr>
         </p:nvSpPr>
         <p:spPr>
           <a:xfrm>
-            <a:off x="274640" y="1820862"/>
-            <a:ext cx="6248398" cy="4185761"/>
+            <a:off x="5753412" y="1668463"/>
+            <a:ext cx="5865037" cy="3505200"/>
           </a:xfrm>
-          <a:prstGeom prst="rect">
-            <a:avLst/>
-          </a:prstGeom>
         </p:spPr>
         <p:txBody>
           <a:bodyPr/>
           <a:lstStyle/>
           <a:p>
+            <a:pPr marL="571500" indent="-571500">
+              <a:buFont typeface="Arial" panose="020B0604020202020204" pitchFamily="34" charset="0"/>
+              <a:buChar char="•"/>
+            </a:pPr>
             <a:r>
               <a:rPr lang="en-US" dirty="0"/>
-              <a:t>If there’s no local account admin can create a new local account and then link.</a:t>
-            </a:r>
-          </a:p>
-          <a:p>
+              <a:t>Admin needs to consent when first go to admin panel.</a:t>
+            </a:r>
+          </a:p>
+          <a:p>
+            <a:pPr marL="571500" indent="-571500">
+              <a:buFont typeface="Arial" panose="020B0604020202020204" pitchFamily="34" charset="0"/>
+              <a:buChar char="•"/>
+            </a:pPr>
             <a:r>
               <a:rPr lang="en-US" dirty="0"/>
-              <a:t>Select favorite color and then click </a:t>
+              <a:t>Click </a:t>
             </a:r>
             <a:r>
               <a:rPr lang="en-US" b="1" dirty="0"/>
-              <a:t>Create and Link</a:t>
+              <a:t>Consent</a:t>
             </a:r>
             <a:r>
               <a:rPr lang="en-US" dirty="0"/>
-              <a:t> button.</a:t>
+              <a:t> button to login and accept and then consent success. </a:t>
+            </a:r>
+          </a:p>
+        </p:txBody>
+      </p:sp>
+      <p:sp>
+        <p:nvSpPr>
+          <p:cNvPr id="3" name="Title 2"/>
+          <p:cNvSpPr>
+            <a:spLocks noGrp="1"/>
+          </p:cNvSpPr>
+          <p:nvPr>
+            <p:ph type="title"/>
+          </p:nvPr>
+        </p:nvSpPr>
+        <p:spPr/>
+        <p:txBody>
+          <a:bodyPr/>
+          <a:lstStyle/>
+          <a:p>
+            <a:r>
+              <a:rPr lang="en-US" dirty="0"/>
+              <a:t>Admin Panel</a:t>
             </a:r>
           </a:p>
         </p:txBody>
       </p:sp>
       <p:pic>
         <p:nvPicPr>
-          <p:cNvPr id="4" name="Picture 3"/>
+          <p:cNvPr id="5" name="Picture 4"/>
           <p:cNvPicPr>
             <a:picLocks noChangeAspect="1"/>
           </p:cNvPicPr>
@@ -33370,8 +33434,8 @@
         </p:blipFill>
         <p:spPr>
           <a:xfrm>
-            <a:off x="6549481" y="2125662"/>
-            <a:ext cx="4857143" cy="1542857"/>
+            <a:off x="282576" y="1592263"/>
+            <a:ext cx="5470836" cy="1828800"/>
           </a:xfrm>
           <a:prstGeom prst="rect">
             <a:avLst/>
@@ -33381,7 +33445,7 @@
     </p:spTree>
     <p:extLst>
       <p:ext uri="{BB962C8B-B14F-4D97-AF65-F5344CB8AC3E}">
-        <p14:creationId xmlns:p14="http://schemas.microsoft.com/office/powerpoint/2010/main" val="4154162200"/>
+        <p14:creationId xmlns:p14="http://schemas.microsoft.com/office/powerpoint/2010/main" val="1906374937"/>
       </p:ext>
     </p:extLst>
   </p:cSld>
@@ -34857,12 +34921,6 @@
 </file>
 
 <file path=customXml/item2.xml><?xml version="1.0" encoding="utf-8"?>
-<p:properties xmlns:p="http://schemas.microsoft.com/office/2006/metadata/properties" xmlns:xsi="http://www.w3.org/2001/XMLSchema-instance" xmlns:pc="http://schemas.microsoft.com/office/infopath/2007/PartnerControls">
-  <documentManagement/>
-</p:properties>
-</file>
-
-<file path=customXml/item3.xml><?xml version="1.0" encoding="utf-8"?>
 <ct:contentTypeSchema xmlns:ct="http://schemas.microsoft.com/office/2006/metadata/contentType" xmlns:ma="http://schemas.microsoft.com/office/2006/metadata/properties/metaAttributes" ct:_="" ma:_="" ma:contentTypeName="Document" ma:contentTypeID="0x01010053433B08FA9EE742BB667ECEF5AA0226" ma:contentTypeVersion="4" ma:contentTypeDescription="Create a new document." ma:contentTypeScope="" ma:versionID="898350153c3cb7409c9d00c11df4aa1a">
   <xsd:schema xmlns:xsd="http://www.w3.org/2001/XMLSchema" xmlns:xs="http://www.w3.org/2001/XMLSchema" xmlns:p="http://schemas.microsoft.com/office/2006/metadata/properties" xmlns:ns2="09eba053-c572-4474-974d-b0bef0e9174f" targetNamespace="http://schemas.microsoft.com/office/2006/metadata/properties" ma:root="true" ma:fieldsID="f69afda497831ad76ed280df00c0bf48" ns2:_="">
     <xsd:import namespace="09eba053-c572-4474-974d-b0bef0e9174f"/>
@@ -35024,6 +35082,12 @@
 </ct:contentTypeSchema>
 </file>
 
+<file path=customXml/item3.xml><?xml version="1.0" encoding="utf-8"?>
+<p:properties xmlns:p="http://schemas.microsoft.com/office/2006/metadata/properties" xmlns:xsi="http://www.w3.org/2001/XMLSchema-instance" xmlns:pc="http://schemas.microsoft.com/office/infopath/2007/PartnerControls">
+  <documentManagement/>
+</p:properties>
+</file>
+
 <file path=customXml/itemProps1.xml><?xml version="1.0" encoding="utf-8"?>
 <ds:datastoreItem xmlns:ds="http://schemas.openxmlformats.org/officeDocument/2006/customXml" ds:itemID="{41543473-98BF-41A8-AEE8-AF1C274C4DD8}">
   <ds:schemaRefs>
@@ -35033,22 +35097,6 @@
 </file>
 
 <file path=customXml/itemProps2.xml><?xml version="1.0" encoding="utf-8"?>
-<ds:datastoreItem xmlns:ds="http://schemas.openxmlformats.org/officeDocument/2006/customXml" ds:itemID="{479EF7F2-79F0-4950-9137-4016BE64CE46}">
-  <ds:schemaRefs>
-    <ds:schemaRef ds:uri="http://purl.org/dc/elements/1.1/"/>
-    <ds:schemaRef ds:uri="http://schemas.microsoft.com/office/2006/metadata/properties"/>
-    <ds:schemaRef ds:uri="09eba053-c572-4474-974d-b0bef0e9174f"/>
-    <ds:schemaRef ds:uri="http://schemas.microsoft.com/office/2006/documentManagement/types"/>
-    <ds:schemaRef ds:uri="http://purl.org/dc/terms/"/>
-    <ds:schemaRef ds:uri="http://schemas.openxmlformats.org/package/2006/metadata/core-properties"/>
-    <ds:schemaRef ds:uri="http://purl.org/dc/dcmitype/"/>
-    <ds:schemaRef ds:uri="http://schemas.microsoft.com/office/infopath/2007/PartnerControls"/>
-    <ds:schemaRef ds:uri="http://www.w3.org/XML/1998/namespace"/>
-  </ds:schemaRefs>
-</ds:datastoreItem>
-</file>
-
-<file path=customXml/itemProps3.xml><?xml version="1.0" encoding="utf-8"?>
 <ds:datastoreItem xmlns:ds="http://schemas.openxmlformats.org/officeDocument/2006/customXml" ds:itemID="{55F7FE33-E5CA-47B4-B8F6-126891A96CF6}">
   <ds:schemaRefs>
     <ds:schemaRef ds:uri="http://schemas.microsoft.com/office/2006/metadata/contentType"/>
@@ -35064,4 +35112,20 @@
     <ds:schemaRef ds:uri="http://schemas.microsoft.com/internal/obd"/>
   </ds:schemaRefs>
 </ds:datastoreItem>
+</file>
+
+<file path=customXml/itemProps3.xml><?xml version="1.0" encoding="utf-8"?>
+<ds:datastoreItem xmlns:ds="http://schemas.openxmlformats.org/officeDocument/2006/customXml" ds:itemID="{479EF7F2-79F0-4950-9137-4016BE64CE46}">
+  <ds:schemaRefs>
+    <ds:schemaRef ds:uri="http://purl.org/dc/elements/1.1/"/>
+    <ds:schemaRef ds:uri="http://schemas.microsoft.com/office/2006/metadata/properties"/>
+    <ds:schemaRef ds:uri="09eba053-c572-4474-974d-b0bef0e9174f"/>
+    <ds:schemaRef ds:uri="http://schemas.microsoft.com/office/2006/documentManagement/types"/>
+    <ds:schemaRef ds:uri="http://purl.org/dc/terms/"/>
+    <ds:schemaRef ds:uri="http://schemas.openxmlformats.org/package/2006/metadata/core-properties"/>
+    <ds:schemaRef ds:uri="http://purl.org/dc/dcmitype/"/>
+    <ds:schemaRef ds:uri="http://schemas.microsoft.com/office/infopath/2007/PartnerControls"/>
+    <ds:schemaRef ds:uri="http://www.w3.org/XML/1998/namespace"/>
+  </ds:schemaRefs>
+</ds:datastoreItem>
 </file>
</xml_diff>